<commit_message>
Refactor Password Generator and Add Unit Converter app. Add PubSub JavaScript example
</commit_message>
<xml_diff>
--- a/week-5/wednesday-powerpoint.pptx
+++ b/week-5/wednesday-powerpoint.pptx
@@ -10,7 +10,16 @@
     <p:sldId id="258" r:id="rId4"/>
     <p:sldId id="259" r:id="rId5"/>
     <p:sldId id="260" r:id="rId6"/>
-    <p:sldId id="261" r:id="rId7"/>
+    <p:sldId id="262" r:id="rId7"/>
+    <p:sldId id="261" r:id="rId8"/>
+    <p:sldId id="263" r:id="rId9"/>
+    <p:sldId id="264" r:id="rId10"/>
+    <p:sldId id="265" r:id="rId11"/>
+    <p:sldId id="266" r:id="rId12"/>
+    <p:sldId id="268" r:id="rId13"/>
+    <p:sldId id="267" r:id="rId14"/>
+    <p:sldId id="269" r:id="rId15"/>
+    <p:sldId id="270" r:id="rId16"/>
   </p:sldIdLst>
   <p:sldSz cx="12192000" cy="6858000"/>
   <p:notesSz cx="6858000" cy="9144000"/>
@@ -109,6 +118,11 @@
       </a:defRPr>
     </a:lvl9pPr>
   </p:defaultTextStyle>
+  <p:extLst>
+    <p:ext uri="{EFAFB233-063F-42B5-8137-9DF3F51BA10A}">
+      <p15:sldGuideLst xmlns:p15="http://schemas.microsoft.com/office/powerpoint/2012/main"/>
+    </p:ext>
+  </p:extLst>
 </p:presentation>
 </file>
 
@@ -259,7 +273,7 @@
           <a:p>
             <a:fld id="{E633E426-FBC0-4FAC-89BE-B86A0A7DE3F6}" type="datetimeFigureOut">
               <a:rPr lang="en-US" smtClean="0"/>
-              <a:t>5/5/2021</a:t>
+              <a:t>5/6/2021</a:t>
             </a:fld>
             <a:endParaRPr lang="en-US"/>
           </a:p>
@@ -457,7 +471,7 @@
           <a:p>
             <a:fld id="{E633E426-FBC0-4FAC-89BE-B86A0A7DE3F6}" type="datetimeFigureOut">
               <a:rPr lang="en-US" smtClean="0"/>
-              <a:t>5/5/2021</a:t>
+              <a:t>5/6/2021</a:t>
             </a:fld>
             <a:endParaRPr lang="en-US"/>
           </a:p>
@@ -665,7 +679,7 @@
           <a:p>
             <a:fld id="{E633E426-FBC0-4FAC-89BE-B86A0A7DE3F6}" type="datetimeFigureOut">
               <a:rPr lang="en-US" smtClean="0"/>
-              <a:t>5/5/2021</a:t>
+              <a:t>5/6/2021</a:t>
             </a:fld>
             <a:endParaRPr lang="en-US"/>
           </a:p>
@@ -863,7 +877,7 @@
           <a:p>
             <a:fld id="{E633E426-FBC0-4FAC-89BE-B86A0A7DE3F6}" type="datetimeFigureOut">
               <a:rPr lang="en-US" smtClean="0"/>
-              <a:t>5/5/2021</a:t>
+              <a:t>5/6/2021</a:t>
             </a:fld>
             <a:endParaRPr lang="en-US"/>
           </a:p>
@@ -1138,7 +1152,7 @@
           <a:p>
             <a:fld id="{E633E426-FBC0-4FAC-89BE-B86A0A7DE3F6}" type="datetimeFigureOut">
               <a:rPr lang="en-US" smtClean="0"/>
-              <a:t>5/5/2021</a:t>
+              <a:t>5/6/2021</a:t>
             </a:fld>
             <a:endParaRPr lang="en-US"/>
           </a:p>
@@ -1403,7 +1417,7 @@
           <a:p>
             <a:fld id="{E633E426-FBC0-4FAC-89BE-B86A0A7DE3F6}" type="datetimeFigureOut">
               <a:rPr lang="en-US" smtClean="0"/>
-              <a:t>5/5/2021</a:t>
+              <a:t>5/6/2021</a:t>
             </a:fld>
             <a:endParaRPr lang="en-US"/>
           </a:p>
@@ -1815,7 +1829,7 @@
           <a:p>
             <a:fld id="{E633E426-FBC0-4FAC-89BE-B86A0A7DE3F6}" type="datetimeFigureOut">
               <a:rPr lang="en-US" smtClean="0"/>
-              <a:t>5/5/2021</a:t>
+              <a:t>5/6/2021</a:t>
             </a:fld>
             <a:endParaRPr lang="en-US"/>
           </a:p>
@@ -1956,7 +1970,7 @@
           <a:p>
             <a:fld id="{E633E426-FBC0-4FAC-89BE-B86A0A7DE3F6}" type="datetimeFigureOut">
               <a:rPr lang="en-US" smtClean="0"/>
-              <a:t>5/5/2021</a:t>
+              <a:t>5/6/2021</a:t>
             </a:fld>
             <a:endParaRPr lang="en-US"/>
           </a:p>
@@ -2069,7 +2083,7 @@
           <a:p>
             <a:fld id="{E633E426-FBC0-4FAC-89BE-B86A0A7DE3F6}" type="datetimeFigureOut">
               <a:rPr lang="en-US" smtClean="0"/>
-              <a:t>5/5/2021</a:t>
+              <a:t>5/6/2021</a:t>
             </a:fld>
             <a:endParaRPr lang="en-US"/>
           </a:p>
@@ -2380,7 +2394,7 @@
           <a:p>
             <a:fld id="{E633E426-FBC0-4FAC-89BE-B86A0A7DE3F6}" type="datetimeFigureOut">
               <a:rPr lang="en-US" smtClean="0"/>
-              <a:t>5/5/2021</a:t>
+              <a:t>5/6/2021</a:t>
             </a:fld>
             <a:endParaRPr lang="en-US"/>
           </a:p>
@@ -2668,7 +2682,7 @@
           <a:p>
             <a:fld id="{E633E426-FBC0-4FAC-89BE-B86A0A7DE3F6}" type="datetimeFigureOut">
               <a:rPr lang="en-US" smtClean="0"/>
-              <a:t>5/5/2021</a:t>
+              <a:t>5/6/2021</a:t>
             </a:fld>
             <a:endParaRPr lang="en-US"/>
           </a:p>
@@ -2909,7 +2923,7 @@
           <a:p>
             <a:fld id="{E633E426-FBC0-4FAC-89BE-B86A0A7DE3F6}" type="datetimeFigureOut">
               <a:rPr lang="en-US" smtClean="0"/>
-              <a:t>5/5/2021</a:t>
+              <a:t>5/6/2021</a:t>
             </a:fld>
             <a:endParaRPr lang="en-US"/>
           </a:p>
@@ -3428,6 +3442,2020 @@
 </p:sld>
 </file>
 
+<file path=ppt/slides/slide10.xml><?xml version="1.0" encoding="utf-8"?>
+<p:sld xmlns:a="http://schemas.openxmlformats.org/drawingml/2006/main" xmlns:r="http://schemas.openxmlformats.org/officeDocument/2006/relationships" xmlns:p="http://schemas.openxmlformats.org/presentationml/2006/main">
+  <p:cSld>
+    <p:spTree>
+      <p:nvGrpSpPr>
+        <p:cNvPr id="1" name=""/>
+        <p:cNvGrpSpPr/>
+        <p:nvPr/>
+      </p:nvGrpSpPr>
+      <p:grpSpPr>
+        <a:xfrm>
+          <a:off x="0" y="0"/>
+          <a:ext cx="0" cy="0"/>
+          <a:chOff x="0" y="0"/>
+          <a:chExt cx="0" cy="0"/>
+        </a:xfrm>
+      </p:grpSpPr>
+      <p:sp>
+        <p:nvSpPr>
+          <p:cNvPr id="2" name="Title 1">
+            <a:extLst>
+              <a:ext uri="{FF2B5EF4-FFF2-40B4-BE49-F238E27FC236}">
+                <a16:creationId xmlns:a16="http://schemas.microsoft.com/office/drawing/2014/main" id="{7E9C8C2B-D5BA-4999-9100-682AA5C11FD1}"/>
+              </a:ext>
+            </a:extLst>
+          </p:cNvPr>
+          <p:cNvSpPr>
+            <a:spLocks noGrp="1"/>
+          </p:cNvSpPr>
+          <p:nvPr>
+            <p:ph type="title"/>
+          </p:nvPr>
+        </p:nvSpPr>
+        <p:spPr/>
+        <p:txBody>
+          <a:bodyPr/>
+          <a:lstStyle/>
+          <a:p>
+            <a:r>
+              <a:rPr lang="en-US" dirty="0"/>
+              <a:t>Password Generator App</a:t>
+            </a:r>
+          </a:p>
+        </p:txBody>
+      </p:sp>
+      <p:sp>
+        <p:nvSpPr>
+          <p:cNvPr id="3" name="Content Placeholder 2">
+            <a:extLst>
+              <a:ext uri="{FF2B5EF4-FFF2-40B4-BE49-F238E27FC236}">
+                <a16:creationId xmlns:a16="http://schemas.microsoft.com/office/drawing/2014/main" id="{CD47CBEB-7FA3-4D2D-A190-6497D2388C3C}"/>
+              </a:ext>
+            </a:extLst>
+          </p:cNvPr>
+          <p:cNvSpPr>
+            <a:spLocks noGrp="1"/>
+          </p:cNvSpPr>
+          <p:nvPr>
+            <p:ph idx="1"/>
+          </p:nvPr>
+        </p:nvSpPr>
+        <p:spPr>
+          <a:xfrm>
+            <a:off x="838200" y="1488273"/>
+            <a:ext cx="10515600" cy="4351338"/>
+          </a:xfrm>
+        </p:spPr>
+        <p:txBody>
+          <a:bodyPr/>
+          <a:lstStyle/>
+          <a:p>
+            <a:r>
+              <a:rPr lang="en-US" dirty="0"/>
+              <a:t>Currently has everything in the App component</a:t>
+            </a:r>
+          </a:p>
+          <a:p>
+            <a:r>
+              <a:rPr lang="en-US" dirty="0"/>
+              <a:t>We can refactor this to the following:</a:t>
+            </a:r>
+          </a:p>
+        </p:txBody>
+      </p:sp>
+      <p:sp>
+        <p:nvSpPr>
+          <p:cNvPr id="4" name="Rectangle 3">
+            <a:extLst>
+              <a:ext uri="{FF2B5EF4-FFF2-40B4-BE49-F238E27FC236}">
+                <a16:creationId xmlns:a16="http://schemas.microsoft.com/office/drawing/2014/main" id="{2E5CF2F9-804B-4BDB-BB26-99EB77FE6AE4}"/>
+              </a:ext>
+            </a:extLst>
+          </p:cNvPr>
+          <p:cNvSpPr/>
+          <p:nvPr/>
+        </p:nvSpPr>
+        <p:spPr>
+          <a:xfrm>
+            <a:off x="4545367" y="2672179"/>
+            <a:ext cx="2254928" cy="1118586"/>
+          </a:xfrm>
+          <a:prstGeom prst="rect">
+            <a:avLst/>
+          </a:prstGeom>
+        </p:spPr>
+        <p:style>
+          <a:lnRef idx="2">
+            <a:schemeClr val="accent1">
+              <a:shade val="50000"/>
+            </a:schemeClr>
+          </a:lnRef>
+          <a:fillRef idx="1">
+            <a:schemeClr val="accent1"/>
+          </a:fillRef>
+          <a:effectRef idx="0">
+            <a:schemeClr val="accent1"/>
+          </a:effectRef>
+          <a:fontRef idx="minor">
+            <a:schemeClr val="lt1"/>
+          </a:fontRef>
+        </p:style>
+        <p:txBody>
+          <a:bodyPr rtlCol="0" anchor="ctr"/>
+          <a:lstStyle/>
+          <a:p>
+            <a:pPr algn="ctr"/>
+            <a:r>
+              <a:rPr lang="en-US" dirty="0" err="1"/>
+              <a:t>AppComponent</a:t>
+            </a:r>
+            <a:endParaRPr lang="en-US" dirty="0"/>
+          </a:p>
+        </p:txBody>
+      </p:sp>
+      <p:cxnSp>
+        <p:nvCxnSpPr>
+          <p:cNvPr id="6" name="Straight Arrow Connector 5">
+            <a:extLst>
+              <a:ext uri="{FF2B5EF4-FFF2-40B4-BE49-F238E27FC236}">
+                <a16:creationId xmlns:a16="http://schemas.microsoft.com/office/drawing/2014/main" id="{DD230054-086E-478E-A0A6-48949E19B071}"/>
+              </a:ext>
+            </a:extLst>
+          </p:cNvPr>
+          <p:cNvCxnSpPr/>
+          <p:nvPr/>
+        </p:nvCxnSpPr>
+        <p:spPr>
+          <a:xfrm>
+            <a:off x="5610687" y="3861787"/>
+            <a:ext cx="0" cy="870011"/>
+          </a:xfrm>
+          <a:prstGeom prst="straightConnector1">
+            <a:avLst/>
+          </a:prstGeom>
+          <a:ln>
+            <a:tailEnd type="triangle"/>
+          </a:ln>
+        </p:spPr>
+        <p:style>
+          <a:lnRef idx="1">
+            <a:schemeClr val="accent1"/>
+          </a:lnRef>
+          <a:fillRef idx="0">
+            <a:schemeClr val="accent1"/>
+          </a:fillRef>
+          <a:effectRef idx="0">
+            <a:schemeClr val="accent1"/>
+          </a:effectRef>
+          <a:fontRef idx="minor">
+            <a:schemeClr val="tx1"/>
+          </a:fontRef>
+        </p:style>
+      </p:cxnSp>
+      <p:sp>
+        <p:nvSpPr>
+          <p:cNvPr id="7" name="Rectangle 6">
+            <a:extLst>
+              <a:ext uri="{FF2B5EF4-FFF2-40B4-BE49-F238E27FC236}">
+                <a16:creationId xmlns:a16="http://schemas.microsoft.com/office/drawing/2014/main" id="{E69D1EE0-71EA-436D-90FE-7C9557B365AF}"/>
+              </a:ext>
+            </a:extLst>
+          </p:cNvPr>
+          <p:cNvSpPr/>
+          <p:nvPr/>
+        </p:nvSpPr>
+        <p:spPr>
+          <a:xfrm>
+            <a:off x="4545369" y="4916335"/>
+            <a:ext cx="2254926" cy="1118585"/>
+          </a:xfrm>
+          <a:prstGeom prst="rect">
+            <a:avLst/>
+          </a:prstGeom>
+        </p:spPr>
+        <p:style>
+          <a:lnRef idx="2">
+            <a:schemeClr val="accent1">
+              <a:shade val="50000"/>
+            </a:schemeClr>
+          </a:lnRef>
+          <a:fillRef idx="1">
+            <a:schemeClr val="accent1"/>
+          </a:fillRef>
+          <a:effectRef idx="0">
+            <a:schemeClr val="accent1"/>
+          </a:effectRef>
+          <a:fontRef idx="minor">
+            <a:schemeClr val="lt1"/>
+          </a:fontRef>
+        </p:style>
+        <p:txBody>
+          <a:bodyPr rtlCol="0" anchor="ctr"/>
+          <a:lstStyle/>
+          <a:p>
+            <a:pPr algn="ctr"/>
+            <a:r>
+              <a:rPr lang="en-US" dirty="0" err="1"/>
+              <a:t>GeneratorComponent</a:t>
+            </a:r>
+            <a:endParaRPr lang="en-US" dirty="0"/>
+          </a:p>
+        </p:txBody>
+      </p:sp>
+      <p:cxnSp>
+        <p:nvCxnSpPr>
+          <p:cNvPr id="9" name="Straight Arrow Connector 8">
+            <a:extLst>
+              <a:ext uri="{FF2B5EF4-FFF2-40B4-BE49-F238E27FC236}">
+                <a16:creationId xmlns:a16="http://schemas.microsoft.com/office/drawing/2014/main" id="{0BBA4CB4-5B5D-4E20-8A24-3522FA3945C1}"/>
+              </a:ext>
+            </a:extLst>
+          </p:cNvPr>
+          <p:cNvCxnSpPr/>
+          <p:nvPr/>
+        </p:nvCxnSpPr>
+        <p:spPr>
+          <a:xfrm>
+            <a:off x="7084381" y="3133817"/>
+            <a:ext cx="1012054" cy="0"/>
+          </a:xfrm>
+          <a:prstGeom prst="straightConnector1">
+            <a:avLst/>
+          </a:prstGeom>
+          <a:ln>
+            <a:tailEnd type="triangle"/>
+          </a:ln>
+        </p:spPr>
+        <p:style>
+          <a:lnRef idx="1">
+            <a:schemeClr val="accent1"/>
+          </a:lnRef>
+          <a:fillRef idx="0">
+            <a:schemeClr val="accent1"/>
+          </a:fillRef>
+          <a:effectRef idx="0">
+            <a:schemeClr val="accent1"/>
+          </a:effectRef>
+          <a:fontRef idx="minor">
+            <a:schemeClr val="tx1"/>
+          </a:fontRef>
+        </p:style>
+      </p:cxnSp>
+      <p:sp>
+        <p:nvSpPr>
+          <p:cNvPr id="10" name="TextBox 9">
+            <a:extLst>
+              <a:ext uri="{FF2B5EF4-FFF2-40B4-BE49-F238E27FC236}">
+                <a16:creationId xmlns:a16="http://schemas.microsoft.com/office/drawing/2014/main" id="{0EEF85D1-2A9A-47C6-91FB-8B88446026B9}"/>
+              </a:ext>
+            </a:extLst>
+          </p:cNvPr>
+          <p:cNvSpPr txBox="1"/>
+          <p:nvPr/>
+        </p:nvSpPr>
+        <p:spPr>
+          <a:xfrm>
+            <a:off x="6986726" y="2672179"/>
+            <a:ext cx="1012054" cy="369332"/>
+          </a:xfrm>
+          <a:prstGeom prst="rect">
+            <a:avLst/>
+          </a:prstGeom>
+          <a:noFill/>
+        </p:spPr>
+        <p:txBody>
+          <a:bodyPr wrap="square" rtlCol="0">
+            <a:spAutoFit/>
+          </a:bodyPr>
+          <a:lstStyle/>
+          <a:p>
+            <a:r>
+              <a:rPr lang="en-US" dirty="0"/>
+              <a:t>contains</a:t>
+            </a:r>
+          </a:p>
+        </p:txBody>
+      </p:sp>
+      <p:sp>
+        <p:nvSpPr>
+          <p:cNvPr id="11" name="Rectangle 10">
+            <a:extLst>
+              <a:ext uri="{FF2B5EF4-FFF2-40B4-BE49-F238E27FC236}">
+                <a16:creationId xmlns:a16="http://schemas.microsoft.com/office/drawing/2014/main" id="{1FF9B280-905C-417B-AC3B-CE7301D9DCFA}"/>
+              </a:ext>
+            </a:extLst>
+          </p:cNvPr>
+          <p:cNvSpPr/>
+          <p:nvPr/>
+        </p:nvSpPr>
+        <p:spPr>
+          <a:xfrm>
+            <a:off x="8406415" y="2575541"/>
+            <a:ext cx="2059619" cy="1189608"/>
+          </a:xfrm>
+          <a:prstGeom prst="rect">
+            <a:avLst/>
+          </a:prstGeom>
+        </p:spPr>
+        <p:style>
+          <a:lnRef idx="2">
+            <a:schemeClr val="accent1">
+              <a:shade val="50000"/>
+            </a:schemeClr>
+          </a:lnRef>
+          <a:fillRef idx="1">
+            <a:schemeClr val="accent1"/>
+          </a:fillRef>
+          <a:effectRef idx="0">
+            <a:schemeClr val="accent1"/>
+          </a:effectRef>
+          <a:fontRef idx="minor">
+            <a:schemeClr val="lt1"/>
+          </a:fontRef>
+        </p:style>
+        <p:txBody>
+          <a:bodyPr rtlCol="0" anchor="ctr"/>
+          <a:lstStyle/>
+          <a:p>
+            <a:pPr algn="ctr"/>
+            <a:r>
+              <a:rPr lang="en-US" dirty="0"/>
+              <a:t>Input Element for </a:t>
+            </a:r>
+            <a:r>
+              <a:rPr lang="en-US" dirty="0" err="1"/>
+              <a:t>passwordLength</a:t>
+            </a:r>
+            <a:endParaRPr lang="en-US" dirty="0"/>
+          </a:p>
+        </p:txBody>
+      </p:sp>
+      <p:sp>
+        <p:nvSpPr>
+          <p:cNvPr id="12" name="Rectangle 11">
+            <a:extLst>
+              <a:ext uri="{FF2B5EF4-FFF2-40B4-BE49-F238E27FC236}">
+                <a16:creationId xmlns:a16="http://schemas.microsoft.com/office/drawing/2014/main" id="{3A616977-A1C8-4829-92D0-42E8C31B36AA}"/>
+              </a:ext>
+            </a:extLst>
+          </p:cNvPr>
+          <p:cNvSpPr/>
+          <p:nvPr/>
+        </p:nvSpPr>
+        <p:spPr>
+          <a:xfrm>
+            <a:off x="8367944" y="4880823"/>
+            <a:ext cx="2059619" cy="1189608"/>
+          </a:xfrm>
+          <a:prstGeom prst="rect">
+            <a:avLst/>
+          </a:prstGeom>
+        </p:spPr>
+        <p:style>
+          <a:lnRef idx="2">
+            <a:schemeClr val="accent1">
+              <a:shade val="50000"/>
+            </a:schemeClr>
+          </a:lnRef>
+          <a:fillRef idx="1">
+            <a:schemeClr val="accent1"/>
+          </a:fillRef>
+          <a:effectRef idx="0">
+            <a:schemeClr val="accent1"/>
+          </a:effectRef>
+          <a:fontRef idx="minor">
+            <a:schemeClr val="lt1"/>
+          </a:fontRef>
+        </p:style>
+        <p:txBody>
+          <a:bodyPr rtlCol="0" anchor="ctr"/>
+          <a:lstStyle/>
+          <a:p>
+            <a:pPr algn="ctr"/>
+            <a:r>
+              <a:rPr lang="en-US" dirty="0"/>
+              <a:t>Button for generating</a:t>
+            </a:r>
+          </a:p>
+        </p:txBody>
+      </p:sp>
+      <p:cxnSp>
+        <p:nvCxnSpPr>
+          <p:cNvPr id="14" name="Straight Arrow Connector 13">
+            <a:extLst>
+              <a:ext uri="{FF2B5EF4-FFF2-40B4-BE49-F238E27FC236}">
+                <a16:creationId xmlns:a16="http://schemas.microsoft.com/office/drawing/2014/main" id="{DCFCC630-6B17-4D6D-A13D-97882998EB90}"/>
+              </a:ext>
+            </a:extLst>
+          </p:cNvPr>
+          <p:cNvCxnSpPr/>
+          <p:nvPr/>
+        </p:nvCxnSpPr>
+        <p:spPr>
+          <a:xfrm>
+            <a:off x="7084381" y="5475627"/>
+            <a:ext cx="1012054" cy="0"/>
+          </a:xfrm>
+          <a:prstGeom prst="straightConnector1">
+            <a:avLst/>
+          </a:prstGeom>
+          <a:ln>
+            <a:tailEnd type="triangle"/>
+          </a:ln>
+        </p:spPr>
+        <p:style>
+          <a:lnRef idx="1">
+            <a:schemeClr val="accent1"/>
+          </a:lnRef>
+          <a:fillRef idx="0">
+            <a:schemeClr val="accent1"/>
+          </a:fillRef>
+          <a:effectRef idx="0">
+            <a:schemeClr val="accent1"/>
+          </a:effectRef>
+          <a:fontRef idx="minor">
+            <a:schemeClr val="tx1"/>
+          </a:fontRef>
+        </p:style>
+      </p:cxnSp>
+      <p:cxnSp>
+        <p:nvCxnSpPr>
+          <p:cNvPr id="16" name="Straight Arrow Connector 15">
+            <a:extLst>
+              <a:ext uri="{FF2B5EF4-FFF2-40B4-BE49-F238E27FC236}">
+                <a16:creationId xmlns:a16="http://schemas.microsoft.com/office/drawing/2014/main" id="{93DA5433-1FE7-4A6F-8A84-4E144E5C6FA3}"/>
+              </a:ext>
+            </a:extLst>
+          </p:cNvPr>
+          <p:cNvCxnSpPr/>
+          <p:nvPr/>
+        </p:nvCxnSpPr>
+        <p:spPr>
+          <a:xfrm flipH="1">
+            <a:off x="2343705" y="3311371"/>
+            <a:ext cx="1953087" cy="453778"/>
+          </a:xfrm>
+          <a:prstGeom prst="straightConnector1">
+            <a:avLst/>
+          </a:prstGeom>
+          <a:ln>
+            <a:tailEnd type="triangle"/>
+          </a:ln>
+        </p:spPr>
+        <p:style>
+          <a:lnRef idx="1">
+            <a:schemeClr val="accent1"/>
+          </a:lnRef>
+          <a:fillRef idx="0">
+            <a:schemeClr val="accent1"/>
+          </a:fillRef>
+          <a:effectRef idx="0">
+            <a:schemeClr val="accent1"/>
+          </a:effectRef>
+          <a:fontRef idx="minor">
+            <a:schemeClr val="tx1"/>
+          </a:fontRef>
+        </p:style>
+      </p:cxnSp>
+      <p:sp>
+        <p:nvSpPr>
+          <p:cNvPr id="17" name="Rectangle 16">
+            <a:extLst>
+              <a:ext uri="{FF2B5EF4-FFF2-40B4-BE49-F238E27FC236}">
+                <a16:creationId xmlns:a16="http://schemas.microsoft.com/office/drawing/2014/main" id="{CA22822C-F9CA-469F-AFFF-7585E787EC70}"/>
+              </a:ext>
+            </a:extLst>
+          </p:cNvPr>
+          <p:cNvSpPr/>
+          <p:nvPr/>
+        </p:nvSpPr>
+        <p:spPr>
+          <a:xfrm>
+            <a:off x="683581" y="3765149"/>
+            <a:ext cx="1766656" cy="620420"/>
+          </a:xfrm>
+          <a:prstGeom prst="rect">
+            <a:avLst/>
+          </a:prstGeom>
+        </p:spPr>
+        <p:style>
+          <a:lnRef idx="2">
+            <a:schemeClr val="accent1">
+              <a:shade val="50000"/>
+            </a:schemeClr>
+          </a:lnRef>
+          <a:fillRef idx="1">
+            <a:schemeClr val="accent1"/>
+          </a:fillRef>
+          <a:effectRef idx="0">
+            <a:schemeClr val="accent1"/>
+          </a:effectRef>
+          <a:fontRef idx="minor">
+            <a:schemeClr val="lt1"/>
+          </a:fontRef>
+        </p:style>
+        <p:txBody>
+          <a:bodyPr rtlCol="0" anchor="ctr"/>
+          <a:lstStyle/>
+          <a:p>
+            <a:pPr algn="ctr"/>
+            <a:r>
+              <a:rPr lang="en-US" dirty="0" err="1"/>
+              <a:t>ngforexampleComponent</a:t>
+            </a:r>
+            <a:endParaRPr lang="en-US" dirty="0"/>
+          </a:p>
+        </p:txBody>
+      </p:sp>
+      <p:sp>
+        <p:nvSpPr>
+          <p:cNvPr id="18" name="Rectangle 17">
+            <a:extLst>
+              <a:ext uri="{FF2B5EF4-FFF2-40B4-BE49-F238E27FC236}">
+                <a16:creationId xmlns:a16="http://schemas.microsoft.com/office/drawing/2014/main" id="{1AC6644B-F0B9-47AB-B0E4-978E0F3D92EF}"/>
+              </a:ext>
+            </a:extLst>
+          </p:cNvPr>
+          <p:cNvSpPr/>
+          <p:nvPr/>
+        </p:nvSpPr>
+        <p:spPr>
+          <a:xfrm>
+            <a:off x="838200" y="4731798"/>
+            <a:ext cx="1766656" cy="620420"/>
+          </a:xfrm>
+          <a:prstGeom prst="rect">
+            <a:avLst/>
+          </a:prstGeom>
+        </p:spPr>
+        <p:style>
+          <a:lnRef idx="2">
+            <a:schemeClr val="accent1">
+              <a:shade val="50000"/>
+            </a:schemeClr>
+          </a:lnRef>
+          <a:fillRef idx="1">
+            <a:schemeClr val="accent1"/>
+          </a:fillRef>
+          <a:effectRef idx="0">
+            <a:schemeClr val="accent1"/>
+          </a:effectRef>
+          <a:fontRef idx="minor">
+            <a:schemeClr val="lt1"/>
+          </a:fontRef>
+        </p:style>
+        <p:txBody>
+          <a:bodyPr rtlCol="0" anchor="ctr"/>
+          <a:lstStyle/>
+          <a:p>
+            <a:pPr algn="ctr"/>
+            <a:r>
+              <a:rPr lang="en-US" dirty="0" err="1"/>
+              <a:t>ngswitchexampleComponent</a:t>
+            </a:r>
+            <a:endParaRPr lang="en-US" dirty="0"/>
+          </a:p>
+        </p:txBody>
+      </p:sp>
+      <p:cxnSp>
+        <p:nvCxnSpPr>
+          <p:cNvPr id="20" name="Straight Arrow Connector 19">
+            <a:extLst>
+              <a:ext uri="{FF2B5EF4-FFF2-40B4-BE49-F238E27FC236}">
+                <a16:creationId xmlns:a16="http://schemas.microsoft.com/office/drawing/2014/main" id="{A89271FD-7CA4-41F4-934F-91A22D88690C}"/>
+              </a:ext>
+            </a:extLst>
+          </p:cNvPr>
+          <p:cNvCxnSpPr/>
+          <p:nvPr/>
+        </p:nvCxnSpPr>
+        <p:spPr>
+          <a:xfrm flipH="1">
+            <a:off x="2636668" y="3454939"/>
+            <a:ext cx="1819922" cy="1161449"/>
+          </a:xfrm>
+          <a:prstGeom prst="straightConnector1">
+            <a:avLst/>
+          </a:prstGeom>
+          <a:ln>
+            <a:tailEnd type="triangle"/>
+          </a:ln>
+        </p:spPr>
+        <p:style>
+          <a:lnRef idx="1">
+            <a:schemeClr val="accent1"/>
+          </a:lnRef>
+          <a:fillRef idx="0">
+            <a:schemeClr val="accent1"/>
+          </a:fillRef>
+          <a:effectRef idx="0">
+            <a:schemeClr val="accent1"/>
+          </a:effectRef>
+          <a:fontRef idx="minor">
+            <a:schemeClr val="tx1"/>
+          </a:fontRef>
+        </p:style>
+      </p:cxnSp>
+    </p:spTree>
+    <p:extLst>
+      <p:ext uri="{BB962C8B-B14F-4D97-AF65-F5344CB8AC3E}">
+        <p14:creationId xmlns:p14="http://schemas.microsoft.com/office/powerpoint/2010/main" val="2756878243"/>
+      </p:ext>
+    </p:extLst>
+  </p:cSld>
+  <p:clrMapOvr>
+    <a:masterClrMapping/>
+  </p:clrMapOvr>
+</p:sld>
+</file>
+
+<file path=ppt/slides/slide11.xml><?xml version="1.0" encoding="utf-8"?>
+<p:sld xmlns:a="http://schemas.openxmlformats.org/drawingml/2006/main" xmlns:r="http://schemas.openxmlformats.org/officeDocument/2006/relationships" xmlns:p="http://schemas.openxmlformats.org/presentationml/2006/main">
+  <p:cSld>
+    <p:spTree>
+      <p:nvGrpSpPr>
+        <p:cNvPr id="1" name=""/>
+        <p:cNvGrpSpPr/>
+        <p:nvPr/>
+      </p:nvGrpSpPr>
+      <p:grpSpPr>
+        <a:xfrm>
+          <a:off x="0" y="0"/>
+          <a:ext cx="0" cy="0"/>
+          <a:chOff x="0" y="0"/>
+          <a:chExt cx="0" cy="0"/>
+        </a:xfrm>
+      </p:grpSpPr>
+      <p:sp>
+        <p:nvSpPr>
+          <p:cNvPr id="2" name="Title 1">
+            <a:extLst>
+              <a:ext uri="{FF2B5EF4-FFF2-40B4-BE49-F238E27FC236}">
+                <a16:creationId xmlns:a16="http://schemas.microsoft.com/office/drawing/2014/main" id="{9BFFE74E-7FCA-4996-AA9E-C47B377FC299}"/>
+              </a:ext>
+            </a:extLst>
+          </p:cNvPr>
+          <p:cNvSpPr>
+            <a:spLocks noGrp="1"/>
+          </p:cNvSpPr>
+          <p:nvPr>
+            <p:ph type="title"/>
+          </p:nvPr>
+        </p:nvSpPr>
+        <p:spPr/>
+        <p:txBody>
+          <a:bodyPr/>
+          <a:lstStyle/>
+          <a:p>
+            <a:r>
+              <a:rPr lang="en-US" dirty="0"/>
+              <a:t>Input Decorator (Parent-to-child communication)</a:t>
+            </a:r>
+          </a:p>
+        </p:txBody>
+      </p:sp>
+      <p:sp>
+        <p:nvSpPr>
+          <p:cNvPr id="3" name="Content Placeholder 2">
+            <a:extLst>
+              <a:ext uri="{FF2B5EF4-FFF2-40B4-BE49-F238E27FC236}">
+                <a16:creationId xmlns:a16="http://schemas.microsoft.com/office/drawing/2014/main" id="{4A028F0C-49C5-4D73-BF51-FDF2CB46F744}"/>
+              </a:ext>
+            </a:extLst>
+          </p:cNvPr>
+          <p:cNvSpPr>
+            <a:spLocks noGrp="1"/>
+          </p:cNvSpPr>
+          <p:nvPr>
+            <p:ph idx="1"/>
+          </p:nvPr>
+        </p:nvSpPr>
+        <p:spPr/>
+        <p:txBody>
+          <a:bodyPr/>
+          <a:lstStyle/>
+          <a:p>
+            <a:r>
+              <a:rPr lang="en-US" dirty="0"/>
+              <a:t>Allows us to use property binding on our components in order to pass data from a parent component to a child component</a:t>
+            </a:r>
+          </a:p>
+        </p:txBody>
+      </p:sp>
+      <p:pic>
+        <p:nvPicPr>
+          <p:cNvPr id="5" name="Picture 4">
+            <a:extLst>
+              <a:ext uri="{FF2B5EF4-FFF2-40B4-BE49-F238E27FC236}">
+                <a16:creationId xmlns:a16="http://schemas.microsoft.com/office/drawing/2014/main" id="{8995CC35-2919-4488-B393-5CE5C279EDD1}"/>
+              </a:ext>
+            </a:extLst>
+          </p:cNvPr>
+          <p:cNvPicPr>
+            <a:picLocks noChangeAspect="1"/>
+          </p:cNvPicPr>
+          <p:nvPr/>
+        </p:nvPicPr>
+        <p:blipFill>
+          <a:blip r:embed="rId2"/>
+          <a:stretch>
+            <a:fillRect/>
+          </a:stretch>
+        </p:blipFill>
+        <p:spPr>
+          <a:xfrm>
+            <a:off x="1620129" y="3067281"/>
+            <a:ext cx="5400675" cy="847725"/>
+          </a:xfrm>
+          <a:prstGeom prst="rect">
+            <a:avLst/>
+          </a:prstGeom>
+        </p:spPr>
+      </p:pic>
+      <p:sp>
+        <p:nvSpPr>
+          <p:cNvPr id="6" name="TextBox 5">
+            <a:extLst>
+              <a:ext uri="{FF2B5EF4-FFF2-40B4-BE49-F238E27FC236}">
+                <a16:creationId xmlns:a16="http://schemas.microsoft.com/office/drawing/2014/main" id="{18180AA6-DE46-4F97-A4F1-D6834F821A21}"/>
+              </a:ext>
+            </a:extLst>
+          </p:cNvPr>
+          <p:cNvSpPr txBox="1"/>
+          <p:nvPr/>
+        </p:nvSpPr>
+        <p:spPr>
+          <a:xfrm>
+            <a:off x="1847461" y="2696547"/>
+            <a:ext cx="4248539" cy="369332"/>
+          </a:xfrm>
+          <a:prstGeom prst="rect">
+            <a:avLst/>
+          </a:prstGeom>
+          <a:noFill/>
+        </p:spPr>
+        <p:txBody>
+          <a:bodyPr wrap="square" rtlCol="0">
+            <a:spAutoFit/>
+          </a:bodyPr>
+          <a:lstStyle/>
+          <a:p>
+            <a:r>
+              <a:rPr lang="en-US" dirty="0"/>
+              <a:t>Inside parent component template:</a:t>
+            </a:r>
+          </a:p>
+        </p:txBody>
+      </p:sp>
+      <p:pic>
+        <p:nvPicPr>
+          <p:cNvPr id="8" name="Picture 7">
+            <a:extLst>
+              <a:ext uri="{FF2B5EF4-FFF2-40B4-BE49-F238E27FC236}">
+                <a16:creationId xmlns:a16="http://schemas.microsoft.com/office/drawing/2014/main" id="{3C7E647C-BC90-4AB2-A2E3-0D620B5C5E93}"/>
+              </a:ext>
+            </a:extLst>
+          </p:cNvPr>
+          <p:cNvPicPr>
+            <a:picLocks noChangeAspect="1"/>
+          </p:cNvPicPr>
+          <p:nvPr/>
+        </p:nvPicPr>
+        <p:blipFill>
+          <a:blip r:embed="rId3"/>
+          <a:stretch>
+            <a:fillRect/>
+          </a:stretch>
+        </p:blipFill>
+        <p:spPr>
+          <a:xfrm>
+            <a:off x="1634416" y="4577464"/>
+            <a:ext cx="5372100" cy="1600200"/>
+          </a:xfrm>
+          <a:prstGeom prst="rect">
+            <a:avLst/>
+          </a:prstGeom>
+        </p:spPr>
+      </p:pic>
+      <p:sp>
+        <p:nvSpPr>
+          <p:cNvPr id="9" name="TextBox 8">
+            <a:extLst>
+              <a:ext uri="{FF2B5EF4-FFF2-40B4-BE49-F238E27FC236}">
+                <a16:creationId xmlns:a16="http://schemas.microsoft.com/office/drawing/2014/main" id="{3459FDBB-FD3B-4147-BA9A-A51DD351B5CA}"/>
+              </a:ext>
+            </a:extLst>
+          </p:cNvPr>
+          <p:cNvSpPr txBox="1"/>
+          <p:nvPr/>
+        </p:nvSpPr>
+        <p:spPr>
+          <a:xfrm>
+            <a:off x="1847461" y="4207431"/>
+            <a:ext cx="4248539" cy="369332"/>
+          </a:xfrm>
+          <a:prstGeom prst="rect">
+            <a:avLst/>
+          </a:prstGeom>
+          <a:noFill/>
+        </p:spPr>
+        <p:txBody>
+          <a:bodyPr wrap="square" rtlCol="0">
+            <a:spAutoFit/>
+          </a:bodyPr>
+          <a:lstStyle/>
+          <a:p>
+            <a:r>
+              <a:rPr lang="en-US" dirty="0"/>
+              <a:t>Inside child component:</a:t>
+            </a:r>
+          </a:p>
+        </p:txBody>
+      </p:sp>
+      <p:cxnSp>
+        <p:nvCxnSpPr>
+          <p:cNvPr id="11" name="Straight Arrow Connector 10">
+            <a:extLst>
+              <a:ext uri="{FF2B5EF4-FFF2-40B4-BE49-F238E27FC236}">
+                <a16:creationId xmlns:a16="http://schemas.microsoft.com/office/drawing/2014/main" id="{F13EC511-F00F-4CDF-A435-DAA0C9E9B618}"/>
+              </a:ext>
+            </a:extLst>
+          </p:cNvPr>
+          <p:cNvCxnSpPr>
+            <a:cxnSpLocks/>
+          </p:cNvCxnSpPr>
+          <p:nvPr/>
+        </p:nvCxnSpPr>
+        <p:spPr>
+          <a:xfrm flipH="1">
+            <a:off x="4811697" y="2691496"/>
+            <a:ext cx="4456591" cy="628753"/>
+          </a:xfrm>
+          <a:prstGeom prst="straightConnector1">
+            <a:avLst/>
+          </a:prstGeom>
+          <a:ln>
+            <a:tailEnd type="triangle"/>
+          </a:ln>
+        </p:spPr>
+        <p:style>
+          <a:lnRef idx="1">
+            <a:schemeClr val="accent1"/>
+          </a:lnRef>
+          <a:fillRef idx="0">
+            <a:schemeClr val="accent1"/>
+          </a:fillRef>
+          <a:effectRef idx="0">
+            <a:schemeClr val="accent1"/>
+          </a:effectRef>
+          <a:fontRef idx="minor">
+            <a:schemeClr val="tx1"/>
+          </a:fontRef>
+        </p:style>
+      </p:cxnSp>
+      <p:sp>
+        <p:nvSpPr>
+          <p:cNvPr id="14" name="TextBox 13">
+            <a:extLst>
+              <a:ext uri="{FF2B5EF4-FFF2-40B4-BE49-F238E27FC236}">
+                <a16:creationId xmlns:a16="http://schemas.microsoft.com/office/drawing/2014/main" id="{CFA72436-A8B0-4352-9A73-62F6EDA8C42D}"/>
+              </a:ext>
+            </a:extLst>
+          </p:cNvPr>
+          <p:cNvSpPr txBox="1"/>
+          <p:nvPr/>
+        </p:nvSpPr>
+        <p:spPr>
+          <a:xfrm>
+            <a:off x="7477147" y="2881213"/>
+            <a:ext cx="3279606" cy="1200329"/>
+          </a:xfrm>
+          <a:prstGeom prst="rect">
+            <a:avLst/>
+          </a:prstGeom>
+          <a:noFill/>
+        </p:spPr>
+        <p:txBody>
+          <a:bodyPr wrap="square" rtlCol="0">
+            <a:spAutoFit/>
+          </a:bodyPr>
+          <a:lstStyle/>
+          <a:p>
+            <a:r>
+              <a:rPr lang="en-US" dirty="0"/>
+              <a:t>Property in parent component (</a:t>
+            </a:r>
+            <a:r>
+              <a:rPr lang="en-US" dirty="0" err="1"/>
+              <a:t>passwordLength</a:t>
+            </a:r>
+            <a:r>
+              <a:rPr lang="en-US" dirty="0"/>
+              <a:t>) being passed to length property in child component</a:t>
+            </a:r>
+          </a:p>
+        </p:txBody>
+      </p:sp>
+    </p:spTree>
+    <p:extLst>
+      <p:ext uri="{BB962C8B-B14F-4D97-AF65-F5344CB8AC3E}">
+        <p14:creationId xmlns:p14="http://schemas.microsoft.com/office/powerpoint/2010/main" val="3663126279"/>
+      </p:ext>
+    </p:extLst>
+  </p:cSld>
+  <p:clrMapOvr>
+    <a:masterClrMapping/>
+  </p:clrMapOvr>
+</p:sld>
+</file>
+
+<file path=ppt/slides/slide12.xml><?xml version="1.0" encoding="utf-8"?>
+<p:sld xmlns:a="http://schemas.openxmlformats.org/drawingml/2006/main" xmlns:r="http://schemas.openxmlformats.org/officeDocument/2006/relationships" xmlns:p="http://schemas.openxmlformats.org/presentationml/2006/main">
+  <p:cSld>
+    <p:spTree>
+      <p:nvGrpSpPr>
+        <p:cNvPr id="1" name=""/>
+        <p:cNvGrpSpPr/>
+        <p:nvPr/>
+      </p:nvGrpSpPr>
+      <p:grpSpPr>
+        <a:xfrm>
+          <a:off x="0" y="0"/>
+          <a:ext cx="0" cy="0"/>
+          <a:chOff x="0" y="0"/>
+          <a:chExt cx="0" cy="0"/>
+        </a:xfrm>
+      </p:grpSpPr>
+      <p:sp>
+        <p:nvSpPr>
+          <p:cNvPr id="2" name="Title 1">
+            <a:extLst>
+              <a:ext uri="{FF2B5EF4-FFF2-40B4-BE49-F238E27FC236}">
+                <a16:creationId xmlns:a16="http://schemas.microsoft.com/office/drawing/2014/main" id="{2A75B0E3-8937-4FED-A4B0-7720439CEC04}"/>
+              </a:ext>
+            </a:extLst>
+          </p:cNvPr>
+          <p:cNvSpPr>
+            <a:spLocks noGrp="1"/>
+          </p:cNvSpPr>
+          <p:nvPr>
+            <p:ph type="title"/>
+          </p:nvPr>
+        </p:nvSpPr>
+        <p:spPr/>
+        <p:txBody>
+          <a:bodyPr/>
+          <a:lstStyle/>
+          <a:p>
+            <a:r>
+              <a:rPr lang="en-US" dirty="0"/>
+              <a:t>To introduce child-to-parent, let’s refactor our app again…</a:t>
+            </a:r>
+          </a:p>
+        </p:txBody>
+      </p:sp>
+      <p:sp>
+        <p:nvSpPr>
+          <p:cNvPr id="4" name="Rectangle 3">
+            <a:extLst>
+              <a:ext uri="{FF2B5EF4-FFF2-40B4-BE49-F238E27FC236}">
+                <a16:creationId xmlns:a16="http://schemas.microsoft.com/office/drawing/2014/main" id="{929567CD-73DD-4127-8A85-645D07E270FF}"/>
+              </a:ext>
+            </a:extLst>
+          </p:cNvPr>
+          <p:cNvSpPr/>
+          <p:nvPr/>
+        </p:nvSpPr>
+        <p:spPr>
+          <a:xfrm>
+            <a:off x="4358936" y="1766656"/>
+            <a:ext cx="2388093" cy="1189608"/>
+          </a:xfrm>
+          <a:prstGeom prst="rect">
+            <a:avLst/>
+          </a:prstGeom>
+        </p:spPr>
+        <p:style>
+          <a:lnRef idx="2">
+            <a:schemeClr val="accent1">
+              <a:shade val="50000"/>
+            </a:schemeClr>
+          </a:lnRef>
+          <a:fillRef idx="1">
+            <a:schemeClr val="accent1"/>
+          </a:fillRef>
+          <a:effectRef idx="0">
+            <a:schemeClr val="accent1"/>
+          </a:effectRef>
+          <a:fontRef idx="minor">
+            <a:schemeClr val="lt1"/>
+          </a:fontRef>
+        </p:style>
+        <p:txBody>
+          <a:bodyPr rtlCol="0" anchor="ctr"/>
+          <a:lstStyle/>
+          <a:p>
+            <a:pPr algn="ctr"/>
+            <a:r>
+              <a:rPr lang="en-US" dirty="0" err="1"/>
+              <a:t>AppComponent</a:t>
+            </a:r>
+            <a:endParaRPr lang="en-US" dirty="0"/>
+          </a:p>
+        </p:txBody>
+      </p:sp>
+      <p:cxnSp>
+        <p:nvCxnSpPr>
+          <p:cNvPr id="6" name="Straight Arrow Connector 5">
+            <a:extLst>
+              <a:ext uri="{FF2B5EF4-FFF2-40B4-BE49-F238E27FC236}">
+                <a16:creationId xmlns:a16="http://schemas.microsoft.com/office/drawing/2014/main" id="{13580263-3269-4D39-BE95-D48D01111889}"/>
+              </a:ext>
+            </a:extLst>
+          </p:cNvPr>
+          <p:cNvCxnSpPr>
+            <a:cxnSpLocks/>
+          </p:cNvCxnSpPr>
+          <p:nvPr/>
+        </p:nvCxnSpPr>
+        <p:spPr>
+          <a:xfrm flipH="1">
+            <a:off x="4065973" y="3133817"/>
+            <a:ext cx="319597" cy="683581"/>
+          </a:xfrm>
+          <a:prstGeom prst="straightConnector1">
+            <a:avLst/>
+          </a:prstGeom>
+          <a:ln>
+            <a:tailEnd type="triangle"/>
+          </a:ln>
+        </p:spPr>
+        <p:style>
+          <a:lnRef idx="1">
+            <a:schemeClr val="accent1"/>
+          </a:lnRef>
+          <a:fillRef idx="0">
+            <a:schemeClr val="accent1"/>
+          </a:fillRef>
+          <a:effectRef idx="0">
+            <a:schemeClr val="accent1"/>
+          </a:effectRef>
+          <a:fontRef idx="minor">
+            <a:schemeClr val="tx1"/>
+          </a:fontRef>
+        </p:style>
+      </p:cxnSp>
+      <p:cxnSp>
+        <p:nvCxnSpPr>
+          <p:cNvPr id="8" name="Straight Arrow Connector 7">
+            <a:extLst>
+              <a:ext uri="{FF2B5EF4-FFF2-40B4-BE49-F238E27FC236}">
+                <a16:creationId xmlns:a16="http://schemas.microsoft.com/office/drawing/2014/main" id="{7226BF11-AE9D-4B94-9671-5873933C6100}"/>
+              </a:ext>
+            </a:extLst>
+          </p:cNvPr>
+          <p:cNvCxnSpPr/>
+          <p:nvPr/>
+        </p:nvCxnSpPr>
+        <p:spPr>
+          <a:xfrm>
+            <a:off x="6747029" y="3142695"/>
+            <a:ext cx="435006" cy="759042"/>
+          </a:xfrm>
+          <a:prstGeom prst="straightConnector1">
+            <a:avLst/>
+          </a:prstGeom>
+          <a:ln>
+            <a:tailEnd type="triangle"/>
+          </a:ln>
+        </p:spPr>
+        <p:style>
+          <a:lnRef idx="1">
+            <a:schemeClr val="accent1"/>
+          </a:lnRef>
+          <a:fillRef idx="0">
+            <a:schemeClr val="accent1"/>
+          </a:fillRef>
+          <a:effectRef idx="0">
+            <a:schemeClr val="accent1"/>
+          </a:effectRef>
+          <a:fontRef idx="minor">
+            <a:schemeClr val="tx1"/>
+          </a:fontRef>
+        </p:style>
+      </p:cxnSp>
+      <p:sp>
+        <p:nvSpPr>
+          <p:cNvPr id="10" name="Rectangle 9">
+            <a:extLst>
+              <a:ext uri="{FF2B5EF4-FFF2-40B4-BE49-F238E27FC236}">
+                <a16:creationId xmlns:a16="http://schemas.microsoft.com/office/drawing/2014/main" id="{535A936B-CEEC-42C3-AFA2-4EE9A59F7382}"/>
+              </a:ext>
+            </a:extLst>
+          </p:cNvPr>
+          <p:cNvSpPr/>
+          <p:nvPr/>
+        </p:nvSpPr>
+        <p:spPr>
+          <a:xfrm>
+            <a:off x="6267637" y="4010812"/>
+            <a:ext cx="2254926" cy="1118585"/>
+          </a:xfrm>
+          <a:prstGeom prst="rect">
+            <a:avLst/>
+          </a:prstGeom>
+        </p:spPr>
+        <p:style>
+          <a:lnRef idx="2">
+            <a:schemeClr val="accent1">
+              <a:shade val="50000"/>
+            </a:schemeClr>
+          </a:lnRef>
+          <a:fillRef idx="1">
+            <a:schemeClr val="accent1"/>
+          </a:fillRef>
+          <a:effectRef idx="0">
+            <a:schemeClr val="accent1"/>
+          </a:effectRef>
+          <a:fontRef idx="minor">
+            <a:schemeClr val="lt1"/>
+          </a:fontRef>
+        </p:style>
+        <p:txBody>
+          <a:bodyPr rtlCol="0" anchor="ctr"/>
+          <a:lstStyle/>
+          <a:p>
+            <a:pPr algn="ctr"/>
+            <a:r>
+              <a:rPr lang="en-US" dirty="0" err="1"/>
+              <a:t>GeneratorComponent</a:t>
+            </a:r>
+            <a:endParaRPr lang="en-US" dirty="0"/>
+          </a:p>
+        </p:txBody>
+      </p:sp>
+      <p:sp>
+        <p:nvSpPr>
+          <p:cNvPr id="11" name="Rectangle 10">
+            <a:extLst>
+              <a:ext uri="{FF2B5EF4-FFF2-40B4-BE49-F238E27FC236}">
+                <a16:creationId xmlns:a16="http://schemas.microsoft.com/office/drawing/2014/main" id="{F2BCD7D8-465A-4F25-A481-6C777A3497DD}"/>
+              </a:ext>
+            </a:extLst>
+          </p:cNvPr>
+          <p:cNvSpPr/>
+          <p:nvPr/>
+        </p:nvSpPr>
+        <p:spPr>
+          <a:xfrm>
+            <a:off x="2760957" y="3901737"/>
+            <a:ext cx="2254926" cy="1118585"/>
+          </a:xfrm>
+          <a:prstGeom prst="rect">
+            <a:avLst/>
+          </a:prstGeom>
+        </p:spPr>
+        <p:style>
+          <a:lnRef idx="2">
+            <a:schemeClr val="accent1">
+              <a:shade val="50000"/>
+            </a:schemeClr>
+          </a:lnRef>
+          <a:fillRef idx="1">
+            <a:schemeClr val="accent1"/>
+          </a:fillRef>
+          <a:effectRef idx="0">
+            <a:schemeClr val="accent1"/>
+          </a:effectRef>
+          <a:fontRef idx="minor">
+            <a:schemeClr val="lt1"/>
+          </a:fontRef>
+        </p:style>
+        <p:txBody>
+          <a:bodyPr rtlCol="0" anchor="ctr"/>
+          <a:lstStyle/>
+          <a:p>
+            <a:pPr algn="ctr"/>
+            <a:r>
+              <a:rPr lang="en-US" dirty="0" err="1"/>
+              <a:t>LengthInputComponent</a:t>
+            </a:r>
+            <a:endParaRPr lang="en-US" dirty="0"/>
+          </a:p>
+        </p:txBody>
+      </p:sp>
+      <p:cxnSp>
+        <p:nvCxnSpPr>
+          <p:cNvPr id="13" name="Straight Arrow Connector 12">
+            <a:extLst>
+              <a:ext uri="{FF2B5EF4-FFF2-40B4-BE49-F238E27FC236}">
+                <a16:creationId xmlns:a16="http://schemas.microsoft.com/office/drawing/2014/main" id="{20C794D9-277E-4BFC-BF80-2B320CE09D59}"/>
+              </a:ext>
+            </a:extLst>
+          </p:cNvPr>
+          <p:cNvCxnSpPr/>
+          <p:nvPr/>
+        </p:nvCxnSpPr>
+        <p:spPr>
+          <a:xfrm flipV="1">
+            <a:off x="3071674" y="2512381"/>
+            <a:ext cx="1154097" cy="1136341"/>
+          </a:xfrm>
+          <a:prstGeom prst="straightConnector1">
+            <a:avLst/>
+          </a:prstGeom>
+          <a:ln>
+            <a:tailEnd type="triangle"/>
+          </a:ln>
+        </p:spPr>
+        <p:style>
+          <a:lnRef idx="1">
+            <a:schemeClr val="accent1"/>
+          </a:lnRef>
+          <a:fillRef idx="0">
+            <a:schemeClr val="accent1"/>
+          </a:fillRef>
+          <a:effectRef idx="0">
+            <a:schemeClr val="accent1"/>
+          </a:effectRef>
+          <a:fontRef idx="minor">
+            <a:schemeClr val="tx1"/>
+          </a:fontRef>
+        </p:style>
+      </p:cxnSp>
+      <p:sp>
+        <p:nvSpPr>
+          <p:cNvPr id="14" name="TextBox 13">
+            <a:extLst>
+              <a:ext uri="{FF2B5EF4-FFF2-40B4-BE49-F238E27FC236}">
+                <a16:creationId xmlns:a16="http://schemas.microsoft.com/office/drawing/2014/main" id="{EE477499-EBE2-4C54-92B7-BEF036539A13}"/>
+              </a:ext>
+            </a:extLst>
+          </p:cNvPr>
+          <p:cNvSpPr txBox="1"/>
+          <p:nvPr/>
+        </p:nvSpPr>
+        <p:spPr>
+          <a:xfrm>
+            <a:off x="2281561" y="2505670"/>
+            <a:ext cx="1624613" cy="1477328"/>
+          </a:xfrm>
+          <a:prstGeom prst="rect">
+            <a:avLst/>
+          </a:prstGeom>
+          <a:noFill/>
+        </p:spPr>
+        <p:txBody>
+          <a:bodyPr wrap="square" rtlCol="0">
+            <a:spAutoFit/>
+          </a:bodyPr>
+          <a:lstStyle/>
+          <a:p>
+            <a:r>
+              <a:rPr lang="en-US" dirty="0"/>
+              <a:t>Pass data to app component (child-to-parent)</a:t>
+            </a:r>
+          </a:p>
+        </p:txBody>
+      </p:sp>
+      <p:sp>
+        <p:nvSpPr>
+          <p:cNvPr id="15" name="TextBox 14">
+            <a:extLst>
+              <a:ext uri="{FF2B5EF4-FFF2-40B4-BE49-F238E27FC236}">
+                <a16:creationId xmlns:a16="http://schemas.microsoft.com/office/drawing/2014/main" id="{0B5B5E4C-2862-4561-900F-AFD5425405CE}"/>
+              </a:ext>
+            </a:extLst>
+          </p:cNvPr>
+          <p:cNvSpPr txBox="1"/>
+          <p:nvPr/>
+        </p:nvSpPr>
+        <p:spPr>
+          <a:xfrm>
+            <a:off x="4385570" y="3313565"/>
+            <a:ext cx="1251750" cy="369332"/>
+          </a:xfrm>
+          <a:prstGeom prst="rect">
+            <a:avLst/>
+          </a:prstGeom>
+          <a:noFill/>
+        </p:spPr>
+        <p:txBody>
+          <a:bodyPr wrap="square" rtlCol="0">
+            <a:spAutoFit/>
+          </a:bodyPr>
+          <a:lstStyle/>
+          <a:p>
+            <a:r>
+              <a:rPr lang="en-US" dirty="0"/>
+              <a:t>renders</a:t>
+            </a:r>
+          </a:p>
+        </p:txBody>
+      </p:sp>
+      <p:sp>
+        <p:nvSpPr>
+          <p:cNvPr id="16" name="TextBox 15">
+            <a:extLst>
+              <a:ext uri="{FF2B5EF4-FFF2-40B4-BE49-F238E27FC236}">
+                <a16:creationId xmlns:a16="http://schemas.microsoft.com/office/drawing/2014/main" id="{48F360B1-02D1-45C6-979E-F326314817A9}"/>
+              </a:ext>
+            </a:extLst>
+          </p:cNvPr>
+          <p:cNvSpPr txBox="1"/>
+          <p:nvPr/>
+        </p:nvSpPr>
+        <p:spPr>
+          <a:xfrm>
+            <a:off x="6554682" y="3279390"/>
+            <a:ext cx="1251750" cy="369332"/>
+          </a:xfrm>
+          <a:prstGeom prst="rect">
+            <a:avLst/>
+          </a:prstGeom>
+          <a:noFill/>
+        </p:spPr>
+        <p:txBody>
+          <a:bodyPr wrap="square" rtlCol="0">
+            <a:spAutoFit/>
+          </a:bodyPr>
+          <a:lstStyle/>
+          <a:p>
+            <a:r>
+              <a:rPr lang="en-US" dirty="0"/>
+              <a:t>renders</a:t>
+            </a:r>
+          </a:p>
+        </p:txBody>
+      </p:sp>
+      <p:cxnSp>
+        <p:nvCxnSpPr>
+          <p:cNvPr id="18" name="Straight Arrow Connector 17">
+            <a:extLst>
+              <a:ext uri="{FF2B5EF4-FFF2-40B4-BE49-F238E27FC236}">
+                <a16:creationId xmlns:a16="http://schemas.microsoft.com/office/drawing/2014/main" id="{8F32BDBD-F50D-4D22-83BD-DE37C13EC0E2}"/>
+              </a:ext>
+            </a:extLst>
+          </p:cNvPr>
+          <p:cNvCxnSpPr/>
+          <p:nvPr/>
+        </p:nvCxnSpPr>
+        <p:spPr>
+          <a:xfrm>
+            <a:off x="7075503" y="2512381"/>
+            <a:ext cx="1145219" cy="1305017"/>
+          </a:xfrm>
+          <a:prstGeom prst="straightConnector1">
+            <a:avLst/>
+          </a:prstGeom>
+          <a:ln>
+            <a:tailEnd type="triangle"/>
+          </a:ln>
+        </p:spPr>
+        <p:style>
+          <a:lnRef idx="1">
+            <a:schemeClr val="accent1"/>
+          </a:lnRef>
+          <a:fillRef idx="0">
+            <a:schemeClr val="accent1"/>
+          </a:fillRef>
+          <a:effectRef idx="0">
+            <a:schemeClr val="accent1"/>
+          </a:effectRef>
+          <a:fontRef idx="minor">
+            <a:schemeClr val="tx1"/>
+          </a:fontRef>
+        </p:style>
+      </p:cxnSp>
+      <p:sp>
+        <p:nvSpPr>
+          <p:cNvPr id="19" name="TextBox 18">
+            <a:extLst>
+              <a:ext uri="{FF2B5EF4-FFF2-40B4-BE49-F238E27FC236}">
+                <a16:creationId xmlns:a16="http://schemas.microsoft.com/office/drawing/2014/main" id="{78EE837C-F35E-40AB-A0FA-297849F9B118}"/>
+              </a:ext>
+            </a:extLst>
+          </p:cNvPr>
+          <p:cNvSpPr txBox="1"/>
+          <p:nvPr/>
+        </p:nvSpPr>
+        <p:spPr>
+          <a:xfrm>
+            <a:off x="7664391" y="2745236"/>
+            <a:ext cx="2503500" cy="923330"/>
+          </a:xfrm>
+          <a:prstGeom prst="rect">
+            <a:avLst/>
+          </a:prstGeom>
+          <a:noFill/>
+        </p:spPr>
+        <p:txBody>
+          <a:bodyPr wrap="square" rtlCol="0">
+            <a:spAutoFit/>
+          </a:bodyPr>
+          <a:lstStyle/>
+          <a:p>
+            <a:r>
+              <a:rPr lang="en-US" dirty="0"/>
+              <a:t>Pass data to generator component (parent-to-child)</a:t>
+            </a:r>
+          </a:p>
+        </p:txBody>
+      </p:sp>
+    </p:spTree>
+    <p:extLst>
+      <p:ext uri="{BB962C8B-B14F-4D97-AF65-F5344CB8AC3E}">
+        <p14:creationId xmlns:p14="http://schemas.microsoft.com/office/powerpoint/2010/main" val="3168879236"/>
+      </p:ext>
+    </p:extLst>
+  </p:cSld>
+  <p:clrMapOvr>
+    <a:masterClrMapping/>
+  </p:clrMapOvr>
+</p:sld>
+</file>
+
+<file path=ppt/slides/slide13.xml><?xml version="1.0" encoding="utf-8"?>
+<p:sld xmlns:a="http://schemas.openxmlformats.org/drawingml/2006/main" xmlns:r="http://schemas.openxmlformats.org/officeDocument/2006/relationships" xmlns:p="http://schemas.openxmlformats.org/presentationml/2006/main">
+  <p:cSld>
+    <p:spTree>
+      <p:nvGrpSpPr>
+        <p:cNvPr id="1" name=""/>
+        <p:cNvGrpSpPr/>
+        <p:nvPr/>
+      </p:nvGrpSpPr>
+      <p:grpSpPr>
+        <a:xfrm>
+          <a:off x="0" y="0"/>
+          <a:ext cx="0" cy="0"/>
+          <a:chOff x="0" y="0"/>
+          <a:chExt cx="0" cy="0"/>
+        </a:xfrm>
+      </p:grpSpPr>
+      <p:sp>
+        <p:nvSpPr>
+          <p:cNvPr id="2" name="Title 1">
+            <a:extLst>
+              <a:ext uri="{FF2B5EF4-FFF2-40B4-BE49-F238E27FC236}">
+                <a16:creationId xmlns:a16="http://schemas.microsoft.com/office/drawing/2014/main" id="{00D8A4C8-C81C-44F5-A28F-C7C4679B0ACE}"/>
+              </a:ext>
+            </a:extLst>
+          </p:cNvPr>
+          <p:cNvSpPr>
+            <a:spLocks noGrp="1"/>
+          </p:cNvSpPr>
+          <p:nvPr>
+            <p:ph type="title"/>
+          </p:nvPr>
+        </p:nvSpPr>
+        <p:spPr/>
+        <p:txBody>
+          <a:bodyPr/>
+          <a:lstStyle/>
+          <a:p>
+            <a:r>
+              <a:rPr lang="en-US" dirty="0"/>
+              <a:t>Output Decorator (Child-to-parent communication)</a:t>
+            </a:r>
+          </a:p>
+        </p:txBody>
+      </p:sp>
+      <p:sp>
+        <p:nvSpPr>
+          <p:cNvPr id="3" name="Content Placeholder 2">
+            <a:extLst>
+              <a:ext uri="{FF2B5EF4-FFF2-40B4-BE49-F238E27FC236}">
+                <a16:creationId xmlns:a16="http://schemas.microsoft.com/office/drawing/2014/main" id="{5DEB5565-B5DA-45FD-AFF8-0FDDE6896E74}"/>
+              </a:ext>
+            </a:extLst>
+          </p:cNvPr>
+          <p:cNvSpPr>
+            <a:spLocks noGrp="1"/>
+          </p:cNvSpPr>
+          <p:nvPr>
+            <p:ph idx="1"/>
+          </p:nvPr>
+        </p:nvSpPr>
+        <p:spPr/>
+        <p:txBody>
+          <a:bodyPr/>
+          <a:lstStyle/>
+          <a:p>
+            <a:r>
+              <a:rPr lang="en-US" dirty="0"/>
+              <a:t>We often want to segregate our application into components that display data, and other components that take some input. These components will often be nested inside of a parent component.</a:t>
+            </a:r>
+          </a:p>
+          <a:p>
+            <a:r>
+              <a:rPr lang="en-US" dirty="0"/>
+              <a:t>So, we need to both utilize child-to-parent and parent-to-child to have all of the data properly flowing between components</a:t>
+            </a:r>
+          </a:p>
+        </p:txBody>
+      </p:sp>
+      <p:pic>
+        <p:nvPicPr>
+          <p:cNvPr id="5" name="Picture 4">
+            <a:extLst>
+              <a:ext uri="{FF2B5EF4-FFF2-40B4-BE49-F238E27FC236}">
+                <a16:creationId xmlns:a16="http://schemas.microsoft.com/office/drawing/2014/main" id="{99F09FFE-16E9-4A74-92AC-1DB1974EF465}"/>
+              </a:ext>
+            </a:extLst>
+          </p:cNvPr>
+          <p:cNvPicPr>
+            <a:picLocks noChangeAspect="1"/>
+          </p:cNvPicPr>
+          <p:nvPr/>
+        </p:nvPicPr>
+        <p:blipFill>
+          <a:blip r:embed="rId2"/>
+          <a:stretch>
+            <a:fillRect/>
+          </a:stretch>
+        </p:blipFill>
+        <p:spPr>
+          <a:xfrm>
+            <a:off x="1279460" y="4226767"/>
+            <a:ext cx="2801725" cy="2491467"/>
+          </a:xfrm>
+          <a:prstGeom prst="rect">
+            <a:avLst/>
+          </a:prstGeom>
+        </p:spPr>
+      </p:pic>
+      <p:sp>
+        <p:nvSpPr>
+          <p:cNvPr id="6" name="TextBox 5">
+            <a:extLst>
+              <a:ext uri="{FF2B5EF4-FFF2-40B4-BE49-F238E27FC236}">
+                <a16:creationId xmlns:a16="http://schemas.microsoft.com/office/drawing/2014/main" id="{0107594C-B16F-4719-B304-7E947C2DBD42}"/>
+              </a:ext>
+            </a:extLst>
+          </p:cNvPr>
+          <p:cNvSpPr txBox="1"/>
+          <p:nvPr/>
+        </p:nvSpPr>
+        <p:spPr>
+          <a:xfrm>
+            <a:off x="1118895" y="3907164"/>
+            <a:ext cx="3122853" cy="369332"/>
+          </a:xfrm>
+          <a:prstGeom prst="rect">
+            <a:avLst/>
+          </a:prstGeom>
+          <a:noFill/>
+        </p:spPr>
+        <p:txBody>
+          <a:bodyPr wrap="square" rtlCol="0">
+            <a:spAutoFit/>
+          </a:bodyPr>
+          <a:lstStyle/>
+          <a:p>
+            <a:r>
+              <a:rPr lang="en-US" dirty="0"/>
+              <a:t>Inside child component</a:t>
+            </a:r>
+          </a:p>
+        </p:txBody>
+      </p:sp>
+      <p:pic>
+        <p:nvPicPr>
+          <p:cNvPr id="8" name="Picture 7">
+            <a:extLst>
+              <a:ext uri="{FF2B5EF4-FFF2-40B4-BE49-F238E27FC236}">
+                <a16:creationId xmlns:a16="http://schemas.microsoft.com/office/drawing/2014/main" id="{61ED3440-45CA-44A1-80B6-FA964D2119B4}"/>
+              </a:ext>
+            </a:extLst>
+          </p:cNvPr>
+          <p:cNvPicPr>
+            <a:picLocks noChangeAspect="1"/>
+          </p:cNvPicPr>
+          <p:nvPr/>
+        </p:nvPicPr>
+        <p:blipFill>
+          <a:blip r:embed="rId3"/>
+          <a:stretch>
+            <a:fillRect/>
+          </a:stretch>
+        </p:blipFill>
+        <p:spPr>
+          <a:xfrm>
+            <a:off x="4522445" y="4813400"/>
+            <a:ext cx="7353300" cy="628650"/>
+          </a:xfrm>
+          <a:prstGeom prst="rect">
+            <a:avLst/>
+          </a:prstGeom>
+        </p:spPr>
+      </p:pic>
+      <p:sp>
+        <p:nvSpPr>
+          <p:cNvPr id="9" name="TextBox 8">
+            <a:extLst>
+              <a:ext uri="{FF2B5EF4-FFF2-40B4-BE49-F238E27FC236}">
+                <a16:creationId xmlns:a16="http://schemas.microsoft.com/office/drawing/2014/main" id="{BE1F28DE-826D-427D-A068-BE7B4F095D20}"/>
+              </a:ext>
+            </a:extLst>
+          </p:cNvPr>
+          <p:cNvSpPr txBox="1"/>
+          <p:nvPr/>
+        </p:nvSpPr>
+        <p:spPr>
+          <a:xfrm>
+            <a:off x="5955172" y="4376600"/>
+            <a:ext cx="3524640" cy="369332"/>
+          </a:xfrm>
+          <a:prstGeom prst="rect">
+            <a:avLst/>
+          </a:prstGeom>
+          <a:noFill/>
+        </p:spPr>
+        <p:txBody>
+          <a:bodyPr wrap="square" rtlCol="0">
+            <a:spAutoFit/>
+          </a:bodyPr>
+          <a:lstStyle/>
+          <a:p>
+            <a:r>
+              <a:rPr lang="en-US" dirty="0"/>
+              <a:t>Inside parent component template</a:t>
+            </a:r>
+          </a:p>
+        </p:txBody>
+      </p:sp>
+    </p:spTree>
+    <p:extLst>
+      <p:ext uri="{BB962C8B-B14F-4D97-AF65-F5344CB8AC3E}">
+        <p14:creationId xmlns:p14="http://schemas.microsoft.com/office/powerpoint/2010/main" val="3320058765"/>
+      </p:ext>
+    </p:extLst>
+  </p:cSld>
+  <p:clrMapOvr>
+    <a:masterClrMapping/>
+  </p:clrMapOvr>
+</p:sld>
+</file>
+
+<file path=ppt/slides/slide14.xml><?xml version="1.0" encoding="utf-8"?>
+<p:sld xmlns:a="http://schemas.openxmlformats.org/drawingml/2006/main" xmlns:r="http://schemas.openxmlformats.org/officeDocument/2006/relationships" xmlns:p="http://schemas.openxmlformats.org/presentationml/2006/main">
+  <p:cSld>
+    <p:spTree>
+      <p:nvGrpSpPr>
+        <p:cNvPr id="1" name=""/>
+        <p:cNvGrpSpPr/>
+        <p:nvPr/>
+      </p:nvGrpSpPr>
+      <p:grpSpPr>
+        <a:xfrm>
+          <a:off x="0" y="0"/>
+          <a:ext cx="0" cy="0"/>
+          <a:chOff x="0" y="0"/>
+          <a:chExt cx="0" cy="0"/>
+        </a:xfrm>
+      </p:grpSpPr>
+      <p:sp>
+        <p:nvSpPr>
+          <p:cNvPr id="2" name="Title 1">
+            <a:extLst>
+              <a:ext uri="{FF2B5EF4-FFF2-40B4-BE49-F238E27FC236}">
+                <a16:creationId xmlns:a16="http://schemas.microsoft.com/office/drawing/2014/main" id="{B81C1AF9-68FA-4D5A-92D9-910287BFE21B}"/>
+              </a:ext>
+            </a:extLst>
+          </p:cNvPr>
+          <p:cNvSpPr>
+            <a:spLocks noGrp="1"/>
+          </p:cNvSpPr>
+          <p:nvPr>
+            <p:ph type="title"/>
+          </p:nvPr>
+        </p:nvSpPr>
+        <p:spPr/>
+        <p:txBody>
+          <a:bodyPr/>
+          <a:lstStyle/>
+          <a:p>
+            <a:r>
+              <a:rPr lang="en-US" dirty="0"/>
+              <a:t>Two-way databinding</a:t>
+            </a:r>
+          </a:p>
+        </p:txBody>
+      </p:sp>
+      <p:sp>
+        <p:nvSpPr>
+          <p:cNvPr id="3" name="Content Placeholder 2">
+            <a:extLst>
+              <a:ext uri="{FF2B5EF4-FFF2-40B4-BE49-F238E27FC236}">
+                <a16:creationId xmlns:a16="http://schemas.microsoft.com/office/drawing/2014/main" id="{313C0766-2B60-4645-B196-466683209466}"/>
+              </a:ext>
+            </a:extLst>
+          </p:cNvPr>
+          <p:cNvSpPr>
+            <a:spLocks noGrp="1"/>
+          </p:cNvSpPr>
+          <p:nvPr>
+            <p:ph idx="1"/>
+          </p:nvPr>
+        </p:nvSpPr>
+        <p:spPr/>
+        <p:txBody>
+          <a:bodyPr>
+            <a:normAutofit lnSpcReduction="10000"/>
+          </a:bodyPr>
+          <a:lstStyle/>
+          <a:p>
+            <a:r>
+              <a:rPr lang="en-US" dirty="0"/>
+              <a:t>So far, we have seen 1-way data binding</a:t>
+            </a:r>
+          </a:p>
+          <a:p>
+            <a:pPr lvl="1"/>
+            <a:r>
+              <a:rPr lang="en-US" dirty="0"/>
+              <a:t>String interpolation</a:t>
+            </a:r>
+          </a:p>
+          <a:p>
+            <a:pPr lvl="1"/>
+            <a:r>
+              <a:rPr lang="en-US" dirty="0"/>
+              <a:t>Event binding</a:t>
+            </a:r>
+          </a:p>
+          <a:p>
+            <a:pPr lvl="1"/>
+            <a:r>
+              <a:rPr lang="en-US" dirty="0"/>
+              <a:t>Property binding</a:t>
+            </a:r>
+          </a:p>
+          <a:p>
+            <a:r>
+              <a:rPr lang="en-US" dirty="0"/>
+              <a:t>But there is also 2-way data binding that looks like this:</a:t>
+            </a:r>
+          </a:p>
+          <a:p>
+            <a:pPr lvl="1"/>
+            <a:r>
+              <a:rPr lang="en-US" dirty="0"/>
+              <a:t>[(</a:t>
+            </a:r>
+            <a:r>
+              <a:rPr lang="en-US" dirty="0" err="1"/>
+              <a:t>ngModel</a:t>
+            </a:r>
+            <a:r>
+              <a:rPr lang="en-US" dirty="0"/>
+              <a:t>)] &lt;- “banana in a box”, but don’t say it in an interview</a:t>
+            </a:r>
+          </a:p>
+          <a:p>
+            <a:pPr lvl="1"/>
+            <a:r>
+              <a:rPr lang="en-US" dirty="0"/>
+              <a:t>It links a property in the component with a attribute of an element both ways</a:t>
+            </a:r>
+          </a:p>
+          <a:p>
+            <a:pPr lvl="1"/>
+            <a:r>
+              <a:rPr lang="en-US" dirty="0"/>
+              <a:t>So, if the property in the component changes, it will also change the attribute of the element, and vice versa</a:t>
+            </a:r>
+          </a:p>
+          <a:p>
+            <a:pPr lvl="1"/>
+            <a:r>
+              <a:rPr lang="en-US" dirty="0"/>
+              <a:t>Mostly used w/ input elements: </a:t>
+            </a:r>
+            <a:r>
+              <a:rPr lang="en-US" b="1" dirty="0"/>
+              <a:t>&lt;input [(</a:t>
+            </a:r>
+            <a:r>
+              <a:rPr lang="en-US" b="1" dirty="0" err="1"/>
+              <a:t>ngModel</a:t>
+            </a:r>
+            <a:r>
+              <a:rPr lang="en-US" b="1" dirty="0"/>
+              <a:t>)]=“</a:t>
+            </a:r>
+            <a:r>
+              <a:rPr lang="en-US" b="1" dirty="0" err="1"/>
+              <a:t>someVariable</a:t>
+            </a:r>
+            <a:r>
+              <a:rPr lang="en-US" b="1" dirty="0"/>
+              <a:t>” type=“text” /&gt;</a:t>
+            </a:r>
+          </a:p>
+        </p:txBody>
+      </p:sp>
+    </p:spTree>
+    <p:extLst>
+      <p:ext uri="{BB962C8B-B14F-4D97-AF65-F5344CB8AC3E}">
+        <p14:creationId xmlns:p14="http://schemas.microsoft.com/office/powerpoint/2010/main" val="2738592662"/>
+      </p:ext>
+    </p:extLst>
+  </p:cSld>
+  <p:clrMapOvr>
+    <a:masterClrMapping/>
+  </p:clrMapOvr>
+</p:sld>
+</file>
+
+<file path=ppt/slides/slide15.xml><?xml version="1.0" encoding="utf-8"?>
+<p:sld xmlns:a="http://schemas.openxmlformats.org/drawingml/2006/main" xmlns:r="http://schemas.openxmlformats.org/officeDocument/2006/relationships" xmlns:p="http://schemas.openxmlformats.org/presentationml/2006/main">
+  <p:cSld>
+    <p:spTree>
+      <p:nvGrpSpPr>
+        <p:cNvPr id="1" name=""/>
+        <p:cNvGrpSpPr/>
+        <p:nvPr/>
+      </p:nvGrpSpPr>
+      <p:grpSpPr>
+        <a:xfrm>
+          <a:off x="0" y="0"/>
+          <a:ext cx="0" cy="0"/>
+          <a:chOff x="0" y="0"/>
+          <a:chExt cx="0" cy="0"/>
+        </a:xfrm>
+      </p:grpSpPr>
+      <p:sp>
+        <p:nvSpPr>
+          <p:cNvPr id="2" name="Title 1">
+            <a:extLst>
+              <a:ext uri="{FF2B5EF4-FFF2-40B4-BE49-F238E27FC236}">
+                <a16:creationId xmlns:a16="http://schemas.microsoft.com/office/drawing/2014/main" id="{272BA761-D744-4B07-9838-F6413D7B233A}"/>
+              </a:ext>
+            </a:extLst>
+          </p:cNvPr>
+          <p:cNvSpPr>
+            <a:spLocks noGrp="1"/>
+          </p:cNvSpPr>
+          <p:nvPr>
+            <p:ph type="title"/>
+          </p:nvPr>
+        </p:nvSpPr>
+        <p:spPr/>
+        <p:txBody>
+          <a:bodyPr/>
+          <a:lstStyle/>
+          <a:p>
+            <a:r>
+              <a:rPr lang="en-US" dirty="0"/>
+              <a:t>Setting up 2-way databinding</a:t>
+            </a:r>
+          </a:p>
+        </p:txBody>
+      </p:sp>
+      <p:pic>
+        <p:nvPicPr>
+          <p:cNvPr id="5" name="Picture 4">
+            <a:extLst>
+              <a:ext uri="{FF2B5EF4-FFF2-40B4-BE49-F238E27FC236}">
+                <a16:creationId xmlns:a16="http://schemas.microsoft.com/office/drawing/2014/main" id="{FD1620E3-BB4D-4F94-B478-4532209CBF1C}"/>
+              </a:ext>
+            </a:extLst>
+          </p:cNvPr>
+          <p:cNvPicPr>
+            <a:picLocks noChangeAspect="1"/>
+          </p:cNvPicPr>
+          <p:nvPr/>
+        </p:nvPicPr>
+        <p:blipFill>
+          <a:blip r:embed="rId2"/>
+          <a:stretch>
+            <a:fillRect/>
+          </a:stretch>
+        </p:blipFill>
+        <p:spPr>
+          <a:xfrm>
+            <a:off x="838200" y="1690688"/>
+            <a:ext cx="4657725" cy="4267200"/>
+          </a:xfrm>
+          <a:prstGeom prst="rect">
+            <a:avLst/>
+          </a:prstGeom>
+        </p:spPr>
+      </p:pic>
+      <p:sp>
+        <p:nvSpPr>
+          <p:cNvPr id="6" name="TextBox 5">
+            <a:extLst>
+              <a:ext uri="{FF2B5EF4-FFF2-40B4-BE49-F238E27FC236}">
+                <a16:creationId xmlns:a16="http://schemas.microsoft.com/office/drawing/2014/main" id="{C406D389-7CEE-47E0-8B51-67E07C5DBD97}"/>
+              </a:ext>
+            </a:extLst>
+          </p:cNvPr>
+          <p:cNvSpPr txBox="1"/>
+          <p:nvPr/>
+        </p:nvSpPr>
+        <p:spPr>
+          <a:xfrm>
+            <a:off x="5887616" y="2062065"/>
+            <a:ext cx="4814596" cy="2308324"/>
+          </a:xfrm>
+          <a:prstGeom prst="rect">
+            <a:avLst/>
+          </a:prstGeom>
+          <a:noFill/>
+        </p:spPr>
+        <p:txBody>
+          <a:bodyPr wrap="square" rtlCol="0">
+            <a:spAutoFit/>
+          </a:bodyPr>
+          <a:lstStyle/>
+          <a:p>
+            <a:r>
+              <a:rPr lang="en-US" dirty="0"/>
+              <a:t>We need to import </a:t>
+            </a:r>
+            <a:r>
+              <a:rPr lang="en-US" dirty="0" err="1"/>
+              <a:t>FormsModule</a:t>
+            </a:r>
+            <a:r>
+              <a:rPr lang="en-US" dirty="0"/>
+              <a:t> into the Module that contains the components in which we want to use [(</a:t>
+            </a:r>
+            <a:r>
+              <a:rPr lang="en-US" dirty="0" err="1"/>
+              <a:t>ngModel</a:t>
+            </a:r>
+            <a:r>
+              <a:rPr lang="en-US" dirty="0"/>
+              <a:t>)] with.</a:t>
+            </a:r>
+          </a:p>
+          <a:p>
+            <a:endParaRPr lang="en-US" dirty="0"/>
+          </a:p>
+          <a:p>
+            <a:r>
+              <a:rPr lang="en-US" dirty="0"/>
+              <a:t>So, in this case, the </a:t>
+            </a:r>
+            <a:r>
+              <a:rPr lang="en-US" dirty="0" err="1"/>
+              <a:t>AppComponent</a:t>
+            </a:r>
+            <a:r>
+              <a:rPr lang="en-US" dirty="0"/>
+              <a:t>, </a:t>
+            </a:r>
+            <a:r>
+              <a:rPr lang="en-US" dirty="0" err="1"/>
+              <a:t>SpeedComponent</a:t>
+            </a:r>
+            <a:r>
+              <a:rPr lang="en-US" dirty="0"/>
+              <a:t>, and </a:t>
+            </a:r>
+            <a:r>
+              <a:rPr lang="en-US" dirty="0" err="1"/>
+              <a:t>TemperatureComponent</a:t>
+            </a:r>
+            <a:r>
+              <a:rPr lang="en-US" dirty="0"/>
+              <a:t> all have the ability to utilize [(</a:t>
+            </a:r>
+            <a:r>
+              <a:rPr lang="en-US" dirty="0" err="1"/>
+              <a:t>ngModel</a:t>
+            </a:r>
+            <a:r>
+              <a:rPr lang="en-US" dirty="0"/>
+              <a:t>)], which comes from the </a:t>
+            </a:r>
+            <a:r>
+              <a:rPr lang="en-US" dirty="0" err="1"/>
+              <a:t>FormsModule</a:t>
+            </a:r>
+            <a:endParaRPr lang="en-US" dirty="0"/>
+          </a:p>
+        </p:txBody>
+      </p:sp>
+    </p:spTree>
+    <p:extLst>
+      <p:ext uri="{BB962C8B-B14F-4D97-AF65-F5344CB8AC3E}">
+        <p14:creationId xmlns:p14="http://schemas.microsoft.com/office/powerpoint/2010/main" val="1819577833"/>
+      </p:ext>
+    </p:extLst>
+  </p:cSld>
+  <p:clrMapOvr>
+    <a:masterClrMapping/>
+  </p:clrMapOvr>
+</p:sld>
+</file>
+
 <file path=ppt/slides/slide2.xml><?xml version="1.0" encoding="utf-8"?>
 <p:sld xmlns:a="http://schemas.openxmlformats.org/drawingml/2006/main" xmlns:r="http://schemas.openxmlformats.org/officeDocument/2006/relationships" xmlns:p="http://schemas.openxmlformats.org/presentationml/2006/main">
   <p:cSld>
@@ -4029,6 +6057,159 @@
           <p:cNvPr id="2" name="Title 1">
             <a:extLst>
               <a:ext uri="{FF2B5EF4-FFF2-40B4-BE49-F238E27FC236}">
+                <a16:creationId xmlns:a16="http://schemas.microsoft.com/office/drawing/2014/main" id="{DC370EDE-3A7F-47B7-B3DB-51D34E654A51}"/>
+              </a:ext>
+            </a:extLst>
+          </p:cNvPr>
+          <p:cNvSpPr>
+            <a:spLocks noGrp="1"/>
+          </p:cNvSpPr>
+          <p:nvPr>
+            <p:ph type="title"/>
+          </p:nvPr>
+        </p:nvSpPr>
+        <p:spPr/>
+        <p:txBody>
+          <a:bodyPr/>
+          <a:lstStyle/>
+          <a:p>
+            <a:r>
+              <a:rPr lang="en-US" dirty="0"/>
+              <a:t>Attribute Directives</a:t>
+            </a:r>
+          </a:p>
+        </p:txBody>
+      </p:sp>
+      <p:sp>
+        <p:nvSpPr>
+          <p:cNvPr id="3" name="Content Placeholder 2">
+            <a:extLst>
+              <a:ext uri="{FF2B5EF4-FFF2-40B4-BE49-F238E27FC236}">
+                <a16:creationId xmlns:a16="http://schemas.microsoft.com/office/drawing/2014/main" id="{CDD1E12A-50D3-4E91-8E6B-BEF1BF790CB0}"/>
+              </a:ext>
+            </a:extLst>
+          </p:cNvPr>
+          <p:cNvSpPr>
+            <a:spLocks noGrp="1"/>
+          </p:cNvSpPr>
+          <p:nvPr>
+            <p:ph idx="1"/>
+          </p:nvPr>
+        </p:nvSpPr>
+        <p:spPr/>
+        <p:txBody>
+          <a:bodyPr/>
+          <a:lstStyle/>
+          <a:p>
+            <a:r>
+              <a:rPr lang="en-US" dirty="0"/>
+              <a:t>The most common attribute directives are</a:t>
+            </a:r>
+          </a:p>
+          <a:p>
+            <a:pPr lvl="1"/>
+            <a:r>
+              <a:rPr lang="en-US" dirty="0" err="1"/>
+              <a:t>ngClass</a:t>
+            </a:r>
+            <a:r>
+              <a:rPr lang="en-US" dirty="0"/>
+              <a:t>: used to apply a class to an element. But, </a:t>
+            </a:r>
+            <a:r>
+              <a:rPr lang="en-US" dirty="0" err="1"/>
+              <a:t>ngClass</a:t>
+            </a:r>
+            <a:r>
+              <a:rPr lang="en-US" dirty="0"/>
+              <a:t> enables us to link classes to our elements based on what is on the </a:t>
+            </a:r>
+            <a:r>
+              <a:rPr lang="en-US" dirty="0" err="1"/>
+              <a:t>component.ts</a:t>
+            </a:r>
+            <a:r>
+              <a:rPr lang="en-US" dirty="0"/>
+              <a:t> itself</a:t>
+            </a:r>
+          </a:p>
+          <a:p>
+            <a:pPr lvl="2"/>
+            <a:r>
+              <a:rPr lang="en-US" dirty="0"/>
+              <a:t>You can pass in a string</a:t>
+            </a:r>
+          </a:p>
+          <a:p>
+            <a:pPr lvl="2"/>
+            <a:r>
+              <a:rPr lang="en-US" dirty="0"/>
+              <a:t>An array of strings</a:t>
+            </a:r>
+          </a:p>
+          <a:p>
+            <a:pPr lvl="2"/>
+            <a:r>
+              <a:rPr lang="en-US" dirty="0"/>
+              <a:t>An object w/ the properties being the classes and values being a Boolean</a:t>
+            </a:r>
+          </a:p>
+          <a:p>
+            <a:pPr lvl="1"/>
+            <a:r>
+              <a:rPr lang="en-US" dirty="0" err="1"/>
+              <a:t>ngStyle</a:t>
+            </a:r>
+            <a:r>
+              <a:rPr lang="en-US" dirty="0"/>
+              <a:t>: used to apply some styling to an element. This takes in an object w/ the </a:t>
+            </a:r>
+            <a:r>
+              <a:rPr lang="en-US" dirty="0" err="1"/>
+              <a:t>css</a:t>
+            </a:r>
+            <a:r>
+              <a:rPr lang="en-US" dirty="0"/>
+              <a:t> property and a corresponding value (could be a ternary expression if you want to have different styles according to different conditions)</a:t>
+            </a:r>
+          </a:p>
+        </p:txBody>
+      </p:sp>
+    </p:spTree>
+    <p:extLst>
+      <p:ext uri="{BB962C8B-B14F-4D97-AF65-F5344CB8AC3E}">
+        <p14:creationId xmlns:p14="http://schemas.microsoft.com/office/powerpoint/2010/main" val="567937667"/>
+      </p:ext>
+    </p:extLst>
+  </p:cSld>
+  <p:clrMapOvr>
+    <a:masterClrMapping/>
+  </p:clrMapOvr>
+</p:sld>
+</file>
+
+<file path=ppt/slides/slide7.xml><?xml version="1.0" encoding="utf-8"?>
+<p:sld xmlns:a="http://schemas.openxmlformats.org/drawingml/2006/main" xmlns:r="http://schemas.openxmlformats.org/officeDocument/2006/relationships" xmlns:p="http://schemas.openxmlformats.org/presentationml/2006/main">
+  <p:cSld>
+    <p:spTree>
+      <p:nvGrpSpPr>
+        <p:cNvPr id="1" name=""/>
+        <p:cNvGrpSpPr/>
+        <p:nvPr/>
+      </p:nvGrpSpPr>
+      <p:grpSpPr>
+        <a:xfrm>
+          <a:off x="0" y="0"/>
+          <a:ext cx="0" cy="0"/>
+          <a:chOff x="0" y="0"/>
+          <a:chExt cx="0" cy="0"/>
+        </a:xfrm>
+      </p:grpSpPr>
+      <p:sp>
+        <p:nvSpPr>
+          <p:cNvPr id="2" name="Title 1">
+            <a:extLst>
+              <a:ext uri="{FF2B5EF4-FFF2-40B4-BE49-F238E27FC236}">
                 <a16:creationId xmlns:a16="http://schemas.microsoft.com/office/drawing/2014/main" id="{9FD3B589-61C3-4C0D-9E21-2F766D0A6576}"/>
               </a:ext>
             </a:extLst>
@@ -4111,7 +6292,7 @@
             </a:r>
             <a:r>
               <a:rPr lang="en-US" sz="1600" dirty="0"/>
-              <a:t>(): whenever properties of a component change, this is called. Will be called multiple times during the lifetime of a component based on how many changes occur.</a:t>
+              <a:t>(): whenever input properties of a component change, this is called. Will be called multiple times during the lifetime of a component based on how many input property changes occur.</a:t>
             </a:r>
           </a:p>
           <a:p>
@@ -4165,6 +6346,686 @@
     <p:extLst>
       <p:ext uri="{BB962C8B-B14F-4D97-AF65-F5344CB8AC3E}">
         <p14:creationId xmlns:p14="http://schemas.microsoft.com/office/powerpoint/2010/main" val="1019464140"/>
+      </p:ext>
+    </p:extLst>
+  </p:cSld>
+  <p:clrMapOvr>
+    <a:masterClrMapping/>
+  </p:clrMapOvr>
+</p:sld>
+</file>
+
+<file path=ppt/slides/slide8.xml><?xml version="1.0" encoding="utf-8"?>
+<p:sld xmlns:a="http://schemas.openxmlformats.org/drawingml/2006/main" xmlns:r="http://schemas.openxmlformats.org/officeDocument/2006/relationships" xmlns:p="http://schemas.openxmlformats.org/presentationml/2006/main">
+  <p:cSld>
+    <p:spTree>
+      <p:nvGrpSpPr>
+        <p:cNvPr id="1" name=""/>
+        <p:cNvGrpSpPr/>
+        <p:nvPr/>
+      </p:nvGrpSpPr>
+      <p:grpSpPr>
+        <a:xfrm>
+          <a:off x="0" y="0"/>
+          <a:ext cx="0" cy="0"/>
+          <a:chOff x="0" y="0"/>
+          <a:chExt cx="0" cy="0"/>
+        </a:xfrm>
+      </p:grpSpPr>
+      <p:sp>
+        <p:nvSpPr>
+          <p:cNvPr id="4" name="TextBox 3">
+            <a:extLst>
+              <a:ext uri="{FF2B5EF4-FFF2-40B4-BE49-F238E27FC236}">
+                <a16:creationId xmlns:a16="http://schemas.microsoft.com/office/drawing/2014/main" id="{0FED8F8D-1715-4877-AF8B-F4301B226D49}"/>
+              </a:ext>
+            </a:extLst>
+          </p:cNvPr>
+          <p:cNvSpPr txBox="1"/>
+          <p:nvPr/>
+        </p:nvSpPr>
+        <p:spPr>
+          <a:xfrm>
+            <a:off x="1118584" y="305022"/>
+            <a:ext cx="2370338" cy="646331"/>
+          </a:xfrm>
+          <a:prstGeom prst="rect">
+            <a:avLst/>
+          </a:prstGeom>
+          <a:noFill/>
+        </p:spPr>
+        <p:txBody>
+          <a:bodyPr wrap="square" rtlCol="0">
+            <a:spAutoFit/>
+          </a:bodyPr>
+          <a:lstStyle/>
+          <a:p>
+            <a:r>
+              <a:rPr lang="en-US" dirty="0"/>
+              <a:t>When we first create a component…</a:t>
+            </a:r>
+          </a:p>
+        </p:txBody>
+      </p:sp>
+      <p:sp>
+        <p:nvSpPr>
+          <p:cNvPr id="5" name="Rectangle 4">
+            <a:extLst>
+              <a:ext uri="{FF2B5EF4-FFF2-40B4-BE49-F238E27FC236}">
+                <a16:creationId xmlns:a16="http://schemas.microsoft.com/office/drawing/2014/main" id="{4BCB44BF-FC94-488A-8D89-B0BEEE519C0E}"/>
+              </a:ext>
+            </a:extLst>
+          </p:cNvPr>
+          <p:cNvSpPr/>
+          <p:nvPr/>
+        </p:nvSpPr>
+        <p:spPr>
+          <a:xfrm>
+            <a:off x="1118584" y="1146570"/>
+            <a:ext cx="2095131" cy="1091953"/>
+          </a:xfrm>
+          <a:prstGeom prst="rect">
+            <a:avLst/>
+          </a:prstGeom>
+        </p:spPr>
+        <p:style>
+          <a:lnRef idx="2">
+            <a:schemeClr val="accent1">
+              <a:shade val="50000"/>
+            </a:schemeClr>
+          </a:lnRef>
+          <a:fillRef idx="1">
+            <a:schemeClr val="accent1"/>
+          </a:fillRef>
+          <a:effectRef idx="0">
+            <a:schemeClr val="accent1"/>
+          </a:effectRef>
+          <a:fontRef idx="minor">
+            <a:schemeClr val="lt1"/>
+          </a:fontRef>
+        </p:style>
+        <p:txBody>
+          <a:bodyPr rtlCol="0" anchor="ctr"/>
+          <a:lstStyle/>
+          <a:p>
+            <a:pPr algn="ctr"/>
+            <a:r>
+              <a:rPr lang="en-US" dirty="0"/>
+              <a:t>Constructor called</a:t>
+            </a:r>
+          </a:p>
+        </p:txBody>
+      </p:sp>
+      <p:sp>
+        <p:nvSpPr>
+          <p:cNvPr id="6" name="Rectangle 5">
+            <a:extLst>
+              <a:ext uri="{FF2B5EF4-FFF2-40B4-BE49-F238E27FC236}">
+                <a16:creationId xmlns:a16="http://schemas.microsoft.com/office/drawing/2014/main" id="{10EDA6BE-C71C-4183-B5D7-78092D4A8E9D}"/>
+              </a:ext>
+            </a:extLst>
+          </p:cNvPr>
+          <p:cNvSpPr/>
+          <p:nvPr/>
+        </p:nvSpPr>
+        <p:spPr>
+          <a:xfrm>
+            <a:off x="1118584" y="2433740"/>
+            <a:ext cx="2095131" cy="1091953"/>
+          </a:xfrm>
+          <a:prstGeom prst="rect">
+            <a:avLst/>
+          </a:prstGeom>
+        </p:spPr>
+        <p:style>
+          <a:lnRef idx="2">
+            <a:schemeClr val="accent2">
+              <a:shade val="50000"/>
+            </a:schemeClr>
+          </a:lnRef>
+          <a:fillRef idx="1">
+            <a:schemeClr val="accent2"/>
+          </a:fillRef>
+          <a:effectRef idx="0">
+            <a:schemeClr val="accent2"/>
+          </a:effectRef>
+          <a:fontRef idx="minor">
+            <a:schemeClr val="lt1"/>
+          </a:fontRef>
+        </p:style>
+        <p:txBody>
+          <a:bodyPr rtlCol="0" anchor="ctr"/>
+          <a:lstStyle/>
+          <a:p>
+            <a:pPr algn="ctr"/>
+            <a:r>
+              <a:rPr lang="en-US" dirty="0" err="1"/>
+              <a:t>ngOnChanges</a:t>
+            </a:r>
+            <a:r>
+              <a:rPr lang="en-US" dirty="0"/>
+              <a:t> called</a:t>
+            </a:r>
+          </a:p>
+        </p:txBody>
+      </p:sp>
+      <p:sp>
+        <p:nvSpPr>
+          <p:cNvPr id="7" name="Rectangle 6">
+            <a:extLst>
+              <a:ext uri="{FF2B5EF4-FFF2-40B4-BE49-F238E27FC236}">
+                <a16:creationId xmlns:a16="http://schemas.microsoft.com/office/drawing/2014/main" id="{5FA6A0C8-6D14-400A-8C75-94901D633591}"/>
+              </a:ext>
+            </a:extLst>
+          </p:cNvPr>
+          <p:cNvSpPr/>
+          <p:nvPr/>
+        </p:nvSpPr>
+        <p:spPr>
+          <a:xfrm>
+            <a:off x="1118583" y="3720910"/>
+            <a:ext cx="2095131" cy="1091953"/>
+          </a:xfrm>
+          <a:prstGeom prst="rect">
+            <a:avLst/>
+          </a:prstGeom>
+        </p:spPr>
+        <p:style>
+          <a:lnRef idx="2">
+            <a:schemeClr val="accent4">
+              <a:shade val="50000"/>
+            </a:schemeClr>
+          </a:lnRef>
+          <a:fillRef idx="1">
+            <a:schemeClr val="accent4"/>
+          </a:fillRef>
+          <a:effectRef idx="0">
+            <a:schemeClr val="accent4"/>
+          </a:effectRef>
+          <a:fontRef idx="minor">
+            <a:schemeClr val="lt1"/>
+          </a:fontRef>
+        </p:style>
+        <p:txBody>
+          <a:bodyPr rtlCol="0" anchor="ctr"/>
+          <a:lstStyle/>
+          <a:p>
+            <a:pPr algn="ctr"/>
+            <a:r>
+              <a:rPr lang="en-US" dirty="0" err="1"/>
+              <a:t>ngInit</a:t>
+            </a:r>
+            <a:r>
+              <a:rPr lang="en-US" dirty="0"/>
+              <a:t> called</a:t>
+            </a:r>
+          </a:p>
+        </p:txBody>
+      </p:sp>
+      <p:sp>
+        <p:nvSpPr>
+          <p:cNvPr id="8" name="Rectangle 7">
+            <a:extLst>
+              <a:ext uri="{FF2B5EF4-FFF2-40B4-BE49-F238E27FC236}">
+                <a16:creationId xmlns:a16="http://schemas.microsoft.com/office/drawing/2014/main" id="{78748A1C-6CD9-4E9E-8016-82AFE13D8893}"/>
+              </a:ext>
+            </a:extLst>
+          </p:cNvPr>
+          <p:cNvSpPr/>
+          <p:nvPr/>
+        </p:nvSpPr>
+        <p:spPr>
+          <a:xfrm>
+            <a:off x="1118583" y="5008080"/>
+            <a:ext cx="2095131" cy="1091953"/>
+          </a:xfrm>
+          <a:prstGeom prst="rect">
+            <a:avLst/>
+          </a:prstGeom>
+        </p:spPr>
+        <p:style>
+          <a:lnRef idx="2">
+            <a:schemeClr val="accent6">
+              <a:shade val="50000"/>
+            </a:schemeClr>
+          </a:lnRef>
+          <a:fillRef idx="1">
+            <a:schemeClr val="accent6"/>
+          </a:fillRef>
+          <a:effectRef idx="0">
+            <a:schemeClr val="accent6"/>
+          </a:effectRef>
+          <a:fontRef idx="minor">
+            <a:schemeClr val="lt1"/>
+          </a:fontRef>
+        </p:style>
+        <p:txBody>
+          <a:bodyPr rtlCol="0" anchor="ctr"/>
+          <a:lstStyle/>
+          <a:p>
+            <a:pPr algn="ctr"/>
+            <a:r>
+              <a:rPr lang="en-US" dirty="0" err="1"/>
+              <a:t>ngDoCheck</a:t>
+            </a:r>
+            <a:r>
+              <a:rPr lang="en-US" dirty="0"/>
+              <a:t> called</a:t>
+            </a:r>
+          </a:p>
+        </p:txBody>
+      </p:sp>
+      <p:sp>
+        <p:nvSpPr>
+          <p:cNvPr id="9" name="Rectangle 8">
+            <a:extLst>
+              <a:ext uri="{FF2B5EF4-FFF2-40B4-BE49-F238E27FC236}">
+                <a16:creationId xmlns:a16="http://schemas.microsoft.com/office/drawing/2014/main" id="{7954A1BC-B11F-4310-96BA-CA0AAE65F975}"/>
+              </a:ext>
+            </a:extLst>
+          </p:cNvPr>
+          <p:cNvSpPr/>
+          <p:nvPr/>
+        </p:nvSpPr>
+        <p:spPr>
+          <a:xfrm>
+            <a:off x="8392351" y="2337047"/>
+            <a:ext cx="2095131" cy="1091953"/>
+          </a:xfrm>
+          <a:prstGeom prst="rect">
+            <a:avLst/>
+          </a:prstGeom>
+        </p:spPr>
+        <p:style>
+          <a:lnRef idx="2">
+            <a:schemeClr val="accent1">
+              <a:shade val="50000"/>
+            </a:schemeClr>
+          </a:lnRef>
+          <a:fillRef idx="1">
+            <a:schemeClr val="accent1"/>
+          </a:fillRef>
+          <a:effectRef idx="0">
+            <a:schemeClr val="accent1"/>
+          </a:effectRef>
+          <a:fontRef idx="minor">
+            <a:schemeClr val="lt1"/>
+          </a:fontRef>
+        </p:style>
+        <p:txBody>
+          <a:bodyPr rtlCol="0" anchor="ctr"/>
+          <a:lstStyle/>
+          <a:p>
+            <a:pPr algn="ctr"/>
+            <a:r>
+              <a:rPr lang="en-US" dirty="0" err="1"/>
+              <a:t>ngOnDestroy</a:t>
+            </a:r>
+            <a:r>
+              <a:rPr lang="en-US" dirty="0"/>
+              <a:t> called</a:t>
+            </a:r>
+          </a:p>
+        </p:txBody>
+      </p:sp>
+      <p:cxnSp>
+        <p:nvCxnSpPr>
+          <p:cNvPr id="11" name="Straight Arrow Connector 10">
+            <a:extLst>
+              <a:ext uri="{FF2B5EF4-FFF2-40B4-BE49-F238E27FC236}">
+                <a16:creationId xmlns:a16="http://schemas.microsoft.com/office/drawing/2014/main" id="{BA7121E0-6BE5-496F-BCED-194577CB8BF2}"/>
+              </a:ext>
+            </a:extLst>
+          </p:cNvPr>
+          <p:cNvCxnSpPr/>
+          <p:nvPr/>
+        </p:nvCxnSpPr>
+        <p:spPr>
+          <a:xfrm>
+            <a:off x="577049" y="1287262"/>
+            <a:ext cx="0" cy="4705165"/>
+          </a:xfrm>
+          <a:prstGeom prst="straightConnector1">
+            <a:avLst/>
+          </a:prstGeom>
+          <a:ln>
+            <a:tailEnd type="triangle"/>
+          </a:ln>
+        </p:spPr>
+        <p:style>
+          <a:lnRef idx="1">
+            <a:schemeClr val="accent1"/>
+          </a:lnRef>
+          <a:fillRef idx="0">
+            <a:schemeClr val="accent1"/>
+          </a:fillRef>
+          <a:effectRef idx="0">
+            <a:schemeClr val="accent1"/>
+          </a:effectRef>
+          <a:fontRef idx="minor">
+            <a:schemeClr val="tx1"/>
+          </a:fontRef>
+        </p:style>
+      </p:cxnSp>
+      <p:sp>
+        <p:nvSpPr>
+          <p:cNvPr id="12" name="TextBox 11">
+            <a:extLst>
+              <a:ext uri="{FF2B5EF4-FFF2-40B4-BE49-F238E27FC236}">
+                <a16:creationId xmlns:a16="http://schemas.microsoft.com/office/drawing/2014/main" id="{F27607E1-56F9-4422-94B6-358084037F6D}"/>
+              </a:ext>
+            </a:extLst>
+          </p:cNvPr>
+          <p:cNvSpPr txBox="1"/>
+          <p:nvPr/>
+        </p:nvSpPr>
+        <p:spPr>
+          <a:xfrm>
+            <a:off x="4617865" y="86933"/>
+            <a:ext cx="2370338" cy="1200329"/>
+          </a:xfrm>
+          <a:prstGeom prst="rect">
+            <a:avLst/>
+          </a:prstGeom>
+          <a:noFill/>
+        </p:spPr>
+        <p:txBody>
+          <a:bodyPr wrap="square" rtlCol="0">
+            <a:spAutoFit/>
+          </a:bodyPr>
+          <a:lstStyle/>
+          <a:p>
+            <a:r>
+              <a:rPr lang="en-US" dirty="0"/>
+              <a:t>While the component is running, and a change occurs w/ an </a:t>
+            </a:r>
+            <a:r>
+              <a:rPr lang="en-US" b="1" dirty="0"/>
+              <a:t>input property</a:t>
+            </a:r>
+            <a:r>
+              <a:rPr lang="en-US" dirty="0"/>
+              <a:t>,</a:t>
+            </a:r>
+          </a:p>
+        </p:txBody>
+      </p:sp>
+      <p:sp>
+        <p:nvSpPr>
+          <p:cNvPr id="13" name="Rectangle 12">
+            <a:extLst>
+              <a:ext uri="{FF2B5EF4-FFF2-40B4-BE49-F238E27FC236}">
+                <a16:creationId xmlns:a16="http://schemas.microsoft.com/office/drawing/2014/main" id="{9B990692-EA43-4330-AF77-F04D6A41989C}"/>
+              </a:ext>
+            </a:extLst>
+          </p:cNvPr>
+          <p:cNvSpPr/>
+          <p:nvPr/>
+        </p:nvSpPr>
+        <p:spPr>
+          <a:xfrm>
+            <a:off x="4755468" y="1591841"/>
+            <a:ext cx="2095131" cy="1091953"/>
+          </a:xfrm>
+          <a:prstGeom prst="rect">
+            <a:avLst/>
+          </a:prstGeom>
+        </p:spPr>
+        <p:style>
+          <a:lnRef idx="2">
+            <a:schemeClr val="accent2">
+              <a:shade val="50000"/>
+            </a:schemeClr>
+          </a:lnRef>
+          <a:fillRef idx="1">
+            <a:schemeClr val="accent2"/>
+          </a:fillRef>
+          <a:effectRef idx="0">
+            <a:schemeClr val="accent2"/>
+          </a:effectRef>
+          <a:fontRef idx="minor">
+            <a:schemeClr val="lt1"/>
+          </a:fontRef>
+        </p:style>
+        <p:txBody>
+          <a:bodyPr rtlCol="0" anchor="ctr"/>
+          <a:lstStyle/>
+          <a:p>
+            <a:pPr algn="ctr"/>
+            <a:r>
+              <a:rPr lang="en-US" dirty="0" err="1"/>
+              <a:t>ngOnChanges</a:t>
+            </a:r>
+            <a:r>
+              <a:rPr lang="en-US" dirty="0"/>
+              <a:t> called</a:t>
+            </a:r>
+          </a:p>
+        </p:txBody>
+      </p:sp>
+      <p:sp>
+        <p:nvSpPr>
+          <p:cNvPr id="14" name="Rectangle 13">
+            <a:extLst>
+              <a:ext uri="{FF2B5EF4-FFF2-40B4-BE49-F238E27FC236}">
+                <a16:creationId xmlns:a16="http://schemas.microsoft.com/office/drawing/2014/main" id="{F2F4AF0E-9F3F-4B84-8540-AEBA227EFA19}"/>
+              </a:ext>
+            </a:extLst>
+          </p:cNvPr>
+          <p:cNvSpPr/>
+          <p:nvPr/>
+        </p:nvSpPr>
+        <p:spPr>
+          <a:xfrm>
+            <a:off x="4755467" y="2988373"/>
+            <a:ext cx="2095131" cy="1091953"/>
+          </a:xfrm>
+          <a:prstGeom prst="rect">
+            <a:avLst/>
+          </a:prstGeom>
+        </p:spPr>
+        <p:style>
+          <a:lnRef idx="2">
+            <a:schemeClr val="accent6">
+              <a:shade val="50000"/>
+            </a:schemeClr>
+          </a:lnRef>
+          <a:fillRef idx="1">
+            <a:schemeClr val="accent6"/>
+          </a:fillRef>
+          <a:effectRef idx="0">
+            <a:schemeClr val="accent6"/>
+          </a:effectRef>
+          <a:fontRef idx="minor">
+            <a:schemeClr val="lt1"/>
+          </a:fontRef>
+        </p:style>
+        <p:txBody>
+          <a:bodyPr rtlCol="0" anchor="ctr"/>
+          <a:lstStyle/>
+          <a:p>
+            <a:pPr algn="ctr"/>
+            <a:r>
+              <a:rPr lang="en-US" dirty="0" err="1"/>
+              <a:t>ngDoCheck</a:t>
+            </a:r>
+            <a:r>
+              <a:rPr lang="en-US" dirty="0"/>
+              <a:t> called</a:t>
+            </a:r>
+          </a:p>
+        </p:txBody>
+      </p:sp>
+      <p:cxnSp>
+        <p:nvCxnSpPr>
+          <p:cNvPr id="16" name="Straight Arrow Connector 15">
+            <a:extLst>
+              <a:ext uri="{FF2B5EF4-FFF2-40B4-BE49-F238E27FC236}">
+                <a16:creationId xmlns:a16="http://schemas.microsoft.com/office/drawing/2014/main" id="{50866DC2-C807-45ED-97D7-A50AE3993EC2}"/>
+              </a:ext>
+            </a:extLst>
+          </p:cNvPr>
+          <p:cNvCxnSpPr/>
+          <p:nvPr/>
+        </p:nvCxnSpPr>
+        <p:spPr>
+          <a:xfrm>
+            <a:off x="4385569" y="1591841"/>
+            <a:ext cx="0" cy="2483009"/>
+          </a:xfrm>
+          <a:prstGeom prst="straightConnector1">
+            <a:avLst/>
+          </a:prstGeom>
+          <a:ln>
+            <a:tailEnd type="triangle"/>
+          </a:ln>
+        </p:spPr>
+        <p:style>
+          <a:lnRef idx="1">
+            <a:schemeClr val="accent1"/>
+          </a:lnRef>
+          <a:fillRef idx="0">
+            <a:schemeClr val="accent1"/>
+          </a:fillRef>
+          <a:effectRef idx="0">
+            <a:schemeClr val="accent1"/>
+          </a:effectRef>
+          <a:fontRef idx="minor">
+            <a:schemeClr val="tx1"/>
+          </a:fontRef>
+        </p:style>
+      </p:cxnSp>
+      <p:sp>
+        <p:nvSpPr>
+          <p:cNvPr id="17" name="TextBox 16">
+            <a:extLst>
+              <a:ext uri="{FF2B5EF4-FFF2-40B4-BE49-F238E27FC236}">
+                <a16:creationId xmlns:a16="http://schemas.microsoft.com/office/drawing/2014/main" id="{B3790341-FF08-49EB-BC66-7B398E5CB2D6}"/>
+              </a:ext>
+            </a:extLst>
+          </p:cNvPr>
+          <p:cNvSpPr txBox="1"/>
+          <p:nvPr/>
+        </p:nvSpPr>
+        <p:spPr>
+          <a:xfrm>
+            <a:off x="8392351" y="951353"/>
+            <a:ext cx="1959010" cy="1200329"/>
+          </a:xfrm>
+          <a:prstGeom prst="rect">
+            <a:avLst/>
+          </a:prstGeom>
+          <a:noFill/>
+        </p:spPr>
+        <p:txBody>
+          <a:bodyPr wrap="square" rtlCol="0">
+            <a:spAutoFit/>
+          </a:bodyPr>
+          <a:lstStyle/>
+          <a:p>
+            <a:r>
+              <a:rPr lang="en-US" dirty="0"/>
+              <a:t>When we are no longer rendering a component to the DOM,</a:t>
+            </a:r>
+          </a:p>
+        </p:txBody>
+      </p:sp>
+    </p:spTree>
+    <p:extLst>
+      <p:ext uri="{BB962C8B-B14F-4D97-AF65-F5344CB8AC3E}">
+        <p14:creationId xmlns:p14="http://schemas.microsoft.com/office/powerpoint/2010/main" val="357669173"/>
+      </p:ext>
+    </p:extLst>
+  </p:cSld>
+  <p:clrMapOvr>
+    <a:masterClrMapping/>
+  </p:clrMapOvr>
+</p:sld>
+</file>
+
+<file path=ppt/slides/slide9.xml><?xml version="1.0" encoding="utf-8"?>
+<p:sld xmlns:a="http://schemas.openxmlformats.org/drawingml/2006/main" xmlns:r="http://schemas.openxmlformats.org/officeDocument/2006/relationships" xmlns:p="http://schemas.openxmlformats.org/presentationml/2006/main">
+  <p:cSld>
+    <p:spTree>
+      <p:nvGrpSpPr>
+        <p:cNvPr id="1" name=""/>
+        <p:cNvGrpSpPr/>
+        <p:nvPr/>
+      </p:nvGrpSpPr>
+      <p:grpSpPr>
+        <a:xfrm>
+          <a:off x="0" y="0"/>
+          <a:ext cx="0" cy="0"/>
+          <a:chOff x="0" y="0"/>
+          <a:chExt cx="0" cy="0"/>
+        </a:xfrm>
+      </p:grpSpPr>
+      <p:sp>
+        <p:nvSpPr>
+          <p:cNvPr id="2" name="Title 1">
+            <a:extLst>
+              <a:ext uri="{FF2B5EF4-FFF2-40B4-BE49-F238E27FC236}">
+                <a16:creationId xmlns:a16="http://schemas.microsoft.com/office/drawing/2014/main" id="{394682F4-147C-47E2-8421-62D9DAC5D612}"/>
+              </a:ext>
+            </a:extLst>
+          </p:cNvPr>
+          <p:cNvSpPr>
+            <a:spLocks noGrp="1"/>
+          </p:cNvSpPr>
+          <p:nvPr>
+            <p:ph type="title"/>
+          </p:nvPr>
+        </p:nvSpPr>
+        <p:spPr/>
+        <p:txBody>
+          <a:bodyPr/>
+          <a:lstStyle/>
+          <a:p>
+            <a:r>
+              <a:rPr lang="en-US" dirty="0"/>
+              <a:t>Component Parent-child communication</a:t>
+            </a:r>
+          </a:p>
+        </p:txBody>
+      </p:sp>
+      <p:sp>
+        <p:nvSpPr>
+          <p:cNvPr id="3" name="Content Placeholder 2">
+            <a:extLst>
+              <a:ext uri="{FF2B5EF4-FFF2-40B4-BE49-F238E27FC236}">
+                <a16:creationId xmlns:a16="http://schemas.microsoft.com/office/drawing/2014/main" id="{4F4D072D-D79C-4410-B7C7-AEF209CF6EBA}"/>
+              </a:ext>
+            </a:extLst>
+          </p:cNvPr>
+          <p:cNvSpPr>
+            <a:spLocks noGrp="1"/>
+          </p:cNvSpPr>
+          <p:nvPr>
+            <p:ph idx="1"/>
+          </p:nvPr>
+        </p:nvSpPr>
+        <p:spPr/>
+        <p:txBody>
+          <a:bodyPr/>
+          <a:lstStyle/>
+          <a:p>
+            <a:r>
+              <a:rPr lang="en-US" dirty="0"/>
+              <a:t>In Angular, we have apps composed of MANY different components. Components can be nested inside other components. These nested components are the child components</a:t>
+            </a:r>
+          </a:p>
+          <a:p>
+            <a:r>
+              <a:rPr lang="en-US" dirty="0"/>
+              <a:t>So naturally, we might want to pass data from one component to another. So far, we have only been using a single component where we pass data from the template to the component object itself.</a:t>
+            </a:r>
+          </a:p>
+        </p:txBody>
+      </p:sp>
+    </p:spTree>
+    <p:extLst>
+      <p:ext uri="{BB962C8B-B14F-4D97-AF65-F5344CB8AC3E}">
+        <p14:creationId xmlns:p14="http://schemas.microsoft.com/office/powerpoint/2010/main" val="1138443599"/>
       </p:ext>
     </p:extLst>
   </p:cSld>

</xml_diff>